<commit_message>
Updated english and french versions of PPT
</commit_message>
<xml_diff>
--- a/Seasonally Adjusted Wasting Estimates_EN.pptx
+++ b/Seasonally Adjusted Wasting Estimates_EN.pptx
@@ -5,7 +5,7 @@
     <p:sldMasterId id="2147483648" r:id="rId4"/>
   </p:sldMasterIdLst>
   <p:notesMasterIdLst>
-    <p:notesMasterId r:id="rId19"/>
+    <p:notesMasterId r:id="rId20"/>
   </p:notesMasterIdLst>
   <p:sldIdLst>
     <p:sldId id="2147375708" r:id="rId5"/>
@@ -16,12 +16,13 @@
     <p:sldId id="2147375712" r:id="rId10"/>
     <p:sldId id="2147375717" r:id="rId11"/>
     <p:sldId id="2147375718" r:id="rId12"/>
-    <p:sldId id="2147375719" r:id="rId13"/>
-    <p:sldId id="2147375720" r:id="rId14"/>
-    <p:sldId id="2147375699" r:id="rId15"/>
-    <p:sldId id="2147375721" r:id="rId16"/>
-    <p:sldId id="2147375701" r:id="rId17"/>
-    <p:sldId id="2147375716" r:id="rId18"/>
+    <p:sldId id="2147375723" r:id="rId13"/>
+    <p:sldId id="2147375719" r:id="rId14"/>
+    <p:sldId id="2147375720" r:id="rId15"/>
+    <p:sldId id="2147375699" r:id="rId16"/>
+    <p:sldId id="2147375721" r:id="rId17"/>
+    <p:sldId id="2147375701" r:id="rId18"/>
+    <p:sldId id="2147375716" r:id="rId19"/>
   </p:sldIdLst>
   <p:sldSz cx="12192000" cy="6858000"/>
   <p:notesSz cx="6858000" cy="9144000"/>
@@ -133,6 +134,7 @@
             <p14:sldId id="2147375712"/>
             <p14:sldId id="2147375717"/>
             <p14:sldId id="2147375718"/>
+            <p14:sldId id="2147375723"/>
             <p14:sldId id="2147375719"/>
             <p14:sldId id="2147375720"/>
             <p14:sldId id="2147375699"/>
@@ -153,8 +155,7 @@
 <file path=ppt/revisionInfo.xml><?xml version="1.0" encoding="utf-8"?>
 <p1510:revInfo xmlns:a="http://schemas.openxmlformats.org/drawingml/2006/main" xmlns:r="http://schemas.openxmlformats.org/officeDocument/2006/relationships" xmlns:p1510="http://schemas.microsoft.com/office/powerpoint/2015/10/main">
   <p1510:revLst>
-    <p1510:client id="{0C5CBAD7-0DCB-4A68-8DF4-63FF1CFEE576}" v="81" dt="2025-06-24T13:10:56.771"/>
-    <p1510:client id="{C9A66CFB-6042-496C-912C-F085CF7B408C}" v="3" dt="2025-06-24T14:14:37.879"/>
+    <p1510:client id="{C9A66CFB-6042-496C-912C-F085CF7B408C}" v="4" dt="2025-06-25T16:55:47.928"/>
   </p1510:revLst>
 </p1510:revInfo>
 </file>
@@ -163,8 +164,8 @@
 <pc:chgInfo xmlns:a="http://schemas.openxmlformats.org/drawingml/2006/main" xmlns:r="http://schemas.openxmlformats.org/officeDocument/2006/relationships" xmlns:ac="http://schemas.microsoft.com/office/drawing/2013/main/command" xmlns:pc="http://schemas.microsoft.com/office/powerpoint/2013/main/command">
   <pc:docChgLst>
     <pc:chgData name="Robert Johnston" userId="e719122a-9d1f-4de8-aa66-43936ca21595" providerId="ADAL" clId="{C9A66CFB-6042-496C-912C-F085CF7B408C}"/>
-    <pc:docChg chg="modSld">
-      <pc:chgData name="Robert Johnston" userId="e719122a-9d1f-4de8-aa66-43936ca21595" providerId="ADAL" clId="{C9A66CFB-6042-496C-912C-F085CF7B408C}" dt="2025-06-24T14:14:37.879" v="21" actId="20578"/>
+    <pc:docChg chg="custSel addSld delSld modSld modSection">
+      <pc:chgData name="Robert Johnston" userId="e719122a-9d1f-4de8-aa66-43936ca21595" providerId="ADAL" clId="{C9A66CFB-6042-496C-912C-F085CF7B408C}" dt="2025-06-25T16:57:30.262" v="60" actId="27636"/>
       <pc:docMkLst>
         <pc:docMk/>
       </pc:docMkLst>
@@ -199,6 +200,21 @@
         </pc:spChg>
       </pc:sldChg>
       <pc:sldChg chg="modSp mod">
+        <pc:chgData name="Robert Johnston" userId="e719122a-9d1f-4de8-aa66-43936ca21595" providerId="ADAL" clId="{C9A66CFB-6042-496C-912C-F085CF7B408C}" dt="2025-06-25T16:57:30.262" v="60" actId="27636"/>
+        <pc:sldMkLst>
+          <pc:docMk/>
+          <pc:sldMk cId="1649791741" sldId="2147375719"/>
+        </pc:sldMkLst>
+        <pc:spChg chg="mod">
+          <ac:chgData name="Robert Johnston" userId="e719122a-9d1f-4de8-aa66-43936ca21595" providerId="ADAL" clId="{C9A66CFB-6042-496C-912C-F085CF7B408C}" dt="2025-06-25T16:57:30.262" v="60" actId="27636"/>
+          <ac:spMkLst>
+            <pc:docMk/>
+            <pc:sldMk cId="1649791741" sldId="2147375719"/>
+            <ac:spMk id="3" creationId="{06E75016-E005-DDA6-4FB1-C68F52C9728D}"/>
+          </ac:spMkLst>
+        </pc:spChg>
+      </pc:sldChg>
+      <pc:sldChg chg="modSp mod">
         <pc:chgData name="Robert Johnston" userId="e719122a-9d1f-4de8-aa66-43936ca21595" providerId="ADAL" clId="{C9A66CFB-6042-496C-912C-F085CF7B408C}" dt="2025-06-24T13:54:58.754" v="15" actId="20577"/>
         <pc:sldMkLst>
           <pc:docMk/>
@@ -225,6 +241,28 @@
             <pc:docMk/>
             <pc:sldMk cId="1847436140" sldId="2147375721"/>
             <ac:spMk id="3" creationId="{C7A7CADA-BC8B-3DB2-9C17-A07C309656CF}"/>
+          </ac:spMkLst>
+        </pc:spChg>
+      </pc:sldChg>
+      <pc:sldChg chg="new del">
+        <pc:chgData name="Robert Johnston" userId="e719122a-9d1f-4de8-aa66-43936ca21595" providerId="ADAL" clId="{C9A66CFB-6042-496C-912C-F085CF7B408C}" dt="2025-06-25T16:55:50.140" v="24" actId="47"/>
+        <pc:sldMkLst>
+          <pc:docMk/>
+          <pc:sldMk cId="1887687220" sldId="2147375722"/>
+        </pc:sldMkLst>
+      </pc:sldChg>
+      <pc:sldChg chg="modSp add mod">
+        <pc:chgData name="Robert Johnston" userId="e719122a-9d1f-4de8-aa66-43936ca21595" providerId="ADAL" clId="{C9A66CFB-6042-496C-912C-F085CF7B408C}" dt="2025-06-25T16:56:36.940" v="44" actId="20577"/>
+        <pc:sldMkLst>
+          <pc:docMk/>
+          <pc:sldMk cId="2363725555" sldId="2147375723"/>
+        </pc:sldMkLst>
+        <pc:spChg chg="mod">
+          <ac:chgData name="Robert Johnston" userId="e719122a-9d1f-4de8-aa66-43936ca21595" providerId="ADAL" clId="{C9A66CFB-6042-496C-912C-F085CF7B408C}" dt="2025-06-25T16:56:36.940" v="44" actId="20577"/>
+          <ac:spMkLst>
+            <pc:docMk/>
+            <pc:sldMk cId="2363725555" sldId="2147375723"/>
+            <ac:spMk id="3" creationId="{5562A36E-C111-9C76-FCD8-6F4533583AA4}"/>
           </ac:spMkLst>
         </pc:spChg>
       </pc:sldChg>
@@ -315,7 +353,7 @@
           <a:p>
             <a:fld id="{51918E58-3E89-408C-BCD2-F7156ACDE59C}" type="datetimeFigureOut">
               <a:rPr lang="en-US" smtClean="0"/>
-              <a:t>6/24/2025</a:t>
+              <a:t>6/25/2025</a:t>
             </a:fld>
             <a:endParaRPr lang="en-US"/>
           </a:p>
@@ -1290,10 +1328,30 @@
           <a:bodyPr/>
           <a:lstStyle/>
           <a:p>
+            <a:pPr marL="0" marR="0" lvl="0" indent="0" algn="l" defTabSz="914400" rtl="0" eaLnBrk="1" fontAlgn="auto" latinLnBrk="0" hangingPunct="1">
+              <a:lnSpc>
+                <a:spcPct val="100000"/>
+              </a:lnSpc>
+              <a:spcBef>
+                <a:spcPts val="0"/>
+              </a:spcBef>
+              <a:spcAft>
+                <a:spcPts val="0"/>
+              </a:spcAft>
+              <a:buClrTx/>
+              <a:buSzTx/>
+              <a:buFontTx/>
+              <a:buNone/>
+              <a:tabLst/>
+              <a:defRPr/>
+            </a:pPr>
             <a:r>
               <a:rPr lang="en-US" dirty="0"/>
-              <a:t>Hypothesis</a:t>
-            </a:r>
+              <a:t>Add Heat and child mortality</a:t>
+            </a:r>
+          </a:p>
+          <a:p>
+            <a:endParaRPr lang="en-US" dirty="0"/>
           </a:p>
         </p:txBody>
       </p:sp>
@@ -1314,7 +1372,7 @@
           <a:p>
             <a:fld id="{B4B6109E-FE48-42FE-8789-E0CAF1EE0661}" type="slidenum">
               <a:rPr lang="en-US" smtClean="0"/>
-              <a:t>11</a:t>
+              <a:t>9</a:t>
             </a:fld>
             <a:endParaRPr lang="en-US"/>
           </a:p>
@@ -1323,7 +1381,7 @@
     </p:spTree>
     <p:extLst>
       <p:ext uri="{BB962C8B-B14F-4D97-AF65-F5344CB8AC3E}">
-        <p14:creationId xmlns:p14="http://schemas.microsoft.com/office/powerpoint/2010/main" val="2243066256"/>
+        <p14:creationId xmlns:p14="http://schemas.microsoft.com/office/powerpoint/2010/main" val="597616024"/>
       </p:ext>
     </p:extLst>
   </p:cSld>
@@ -1377,657 +1435,10 @@
           <a:bodyPr/>
           <a:lstStyle/>
           <a:p>
-            <a:pPr>
-              <a:buNone/>
-            </a:pPr>
-            <a:r>
-              <a:rPr lang="en-US" sz="7200" b="1" dirty="0"/>
-              <a:t>Presentation Title:</a:t>
-            </a:r>
-          </a:p>
-          <a:p>
-            <a:pPr>
-              <a:buNone/>
-            </a:pPr>
-            <a:r>
-              <a:rPr lang="en-US" sz="7200" b="1" dirty="0"/>
-              <a:t>Seasonal Caseload Estimates of At-Risk Children: 0–59 Months</a:t>
-            </a:r>
-            <a:endParaRPr lang="en-US" sz="7200" dirty="0"/>
-          </a:p>
-          <a:p>
-            <a:pPr>
-              <a:buNone/>
-            </a:pPr>
-            <a:r>
-              <a:rPr lang="en-US" sz="7200" b="1" dirty="0"/>
-              <a:t>1. Introduction</a:t>
-            </a:r>
-          </a:p>
-          <a:p>
-            <a:pPr>
-              <a:buFont typeface="Arial" panose="020B0604020202020204" pitchFamily="34" charset="0"/>
-              <a:buChar char="•"/>
-            </a:pPr>
-            <a:r>
-              <a:rPr lang="en-US" sz="7200" b="1" dirty="0"/>
-              <a:t>Objective of the Presentation</a:t>
-            </a:r>
-            <a:endParaRPr lang="en-US" sz="7200" dirty="0"/>
-          </a:p>
-          <a:p>
-            <a:pPr marL="742950" lvl="1" indent="-285750">
-              <a:buFont typeface="Arial" panose="020B0604020202020204" pitchFamily="34" charset="0"/>
-              <a:buChar char="•"/>
-            </a:pPr>
-            <a:r>
-              <a:rPr lang="en-US" sz="7200" dirty="0"/>
-              <a:t>To present seasonal caseload estimates for children with SAM (6–59 months)</a:t>
-            </a:r>
-          </a:p>
-          <a:p>
-            <a:pPr marL="742950" lvl="1" indent="-285750">
-              <a:buFont typeface="Arial" panose="020B0604020202020204" pitchFamily="34" charset="0"/>
-              <a:buChar char="•"/>
-            </a:pPr>
-            <a:r>
-              <a:rPr lang="en-US" sz="7200" dirty="0"/>
-              <a:t>To highlight risk burden among infants 0–5 months</a:t>
-            </a:r>
-          </a:p>
-          <a:p>
-            <a:pPr>
-              <a:buFont typeface="Arial" panose="020B0604020202020204" pitchFamily="34" charset="0"/>
-              <a:buChar char="•"/>
-            </a:pPr>
-            <a:r>
-              <a:rPr lang="en-US" sz="7200" b="1" dirty="0"/>
-              <a:t>Why It Matters</a:t>
-            </a:r>
-            <a:endParaRPr lang="en-US" sz="7200" dirty="0"/>
-          </a:p>
-          <a:p>
-            <a:pPr marL="742950" lvl="1" indent="-285750">
-              <a:buFont typeface="Arial" panose="020B0604020202020204" pitchFamily="34" charset="0"/>
-              <a:buChar char="•"/>
-            </a:pPr>
-            <a:r>
-              <a:rPr lang="en-US" sz="7200" dirty="0"/>
-              <a:t>Malnutrition remains a major cause of child mortality</a:t>
-            </a:r>
-          </a:p>
-          <a:p>
-            <a:pPr marL="742950" lvl="1" indent="-285750">
-              <a:buFont typeface="Arial" panose="020B0604020202020204" pitchFamily="34" charset="0"/>
-              <a:buChar char="•"/>
-            </a:pPr>
-            <a:r>
-              <a:rPr lang="en-US" sz="7200" dirty="0"/>
-              <a:t>Timely planning is essential for seasonal peaks</a:t>
-            </a:r>
-          </a:p>
-          <a:p>
-            <a:pPr>
-              <a:buNone/>
-            </a:pPr>
-            <a:r>
-              <a:rPr lang="en-US" sz="7200" b="1" dirty="0"/>
-              <a:t>2. Background and Definitions</a:t>
-            </a:r>
-          </a:p>
-          <a:p>
-            <a:pPr>
-              <a:buFont typeface="Arial" panose="020B0604020202020204" pitchFamily="34" charset="0"/>
-              <a:buChar char="•"/>
-            </a:pPr>
-            <a:r>
-              <a:rPr lang="en-US" sz="7200" b="1" dirty="0"/>
-              <a:t>Severe Acute Malnutrition (SAM)</a:t>
-            </a:r>
-            <a:endParaRPr lang="en-US" sz="7200" dirty="0"/>
-          </a:p>
-          <a:p>
-            <a:pPr marL="742950" lvl="1" indent="-285750">
-              <a:buFont typeface="Arial" panose="020B0604020202020204" pitchFamily="34" charset="0"/>
-              <a:buChar char="•"/>
-            </a:pPr>
-            <a:r>
-              <a:rPr lang="en-US" sz="7200" dirty="0"/>
-              <a:t>Definition and criteria (e.g., WHZ &lt;-3, MUAC &lt;115 mm, or nutritional edema)</a:t>
-            </a:r>
-          </a:p>
-          <a:p>
-            <a:pPr marL="742950" lvl="1" indent="-285750">
-              <a:buFont typeface="Arial" panose="020B0604020202020204" pitchFamily="34" charset="0"/>
-              <a:buChar char="•"/>
-            </a:pPr>
-            <a:r>
-              <a:rPr lang="en-US" sz="7200" dirty="0"/>
-              <a:t>Impact on child mortality and development</a:t>
-            </a:r>
-          </a:p>
-          <a:p>
-            <a:pPr>
-              <a:buFont typeface="Arial" panose="020B0604020202020204" pitchFamily="34" charset="0"/>
-              <a:buChar char="•"/>
-            </a:pPr>
-            <a:r>
-              <a:rPr lang="en-US" sz="7200" b="1" dirty="0"/>
-              <a:t>Children 0–5 Months at Risk of Poor Growth</a:t>
-            </a:r>
-            <a:endParaRPr lang="en-US" sz="7200" dirty="0"/>
-          </a:p>
-          <a:p>
-            <a:pPr marL="742950" lvl="1" indent="-285750">
-              <a:buFont typeface="Arial" panose="020B0604020202020204" pitchFamily="34" charset="0"/>
-              <a:buChar char="•"/>
-            </a:pPr>
-            <a:r>
-              <a:rPr lang="en-US" sz="7200" dirty="0"/>
-              <a:t>Definition of “at-risk” (e.g., low weight-for-age, feeding issues, low MUAC)</a:t>
-            </a:r>
-          </a:p>
-          <a:p>
-            <a:pPr marL="742950" lvl="1" indent="-285750">
-              <a:buFont typeface="Arial" panose="020B0604020202020204" pitchFamily="34" charset="0"/>
-              <a:buChar char="•"/>
-            </a:pPr>
-            <a:r>
-              <a:rPr lang="en-US" sz="7200" dirty="0"/>
-              <a:t>Importance of early identification</a:t>
-            </a:r>
-          </a:p>
-          <a:p>
-            <a:pPr>
-              <a:buNone/>
-            </a:pPr>
-            <a:r>
-              <a:rPr lang="en-US" sz="7200" b="1" dirty="0"/>
-              <a:t>3. Data Sources and Methodology</a:t>
-            </a:r>
-          </a:p>
-          <a:p>
-            <a:pPr>
-              <a:buFont typeface="Arial" panose="020B0604020202020204" pitchFamily="34" charset="0"/>
-              <a:buChar char="•"/>
-            </a:pPr>
-            <a:r>
-              <a:rPr lang="en-US" sz="7200" b="1" dirty="0"/>
-              <a:t>Survey Data</a:t>
-            </a:r>
-            <a:endParaRPr lang="en-US" sz="7200" dirty="0"/>
-          </a:p>
-          <a:p>
-            <a:pPr marL="742950" lvl="1" indent="-285750">
-              <a:buFont typeface="Arial" panose="020B0604020202020204" pitchFamily="34" charset="0"/>
-              <a:buChar char="•"/>
-            </a:pPr>
-            <a:r>
-              <a:rPr lang="en-US" sz="7200" dirty="0"/>
-              <a:t>Sources (e.g., SMART surveys, DHS, MICS, HMIS)</a:t>
-            </a:r>
-          </a:p>
-          <a:p>
-            <a:pPr>
-              <a:buFont typeface="Arial" panose="020B0604020202020204" pitchFamily="34" charset="0"/>
-              <a:buChar char="•"/>
-            </a:pPr>
-            <a:r>
-              <a:rPr lang="en-US" sz="7200" b="1" dirty="0"/>
-              <a:t>Caseload Estimation Formula</a:t>
-            </a:r>
-            <a:endParaRPr lang="en-US" sz="7200" dirty="0"/>
-          </a:p>
-          <a:p>
-            <a:pPr marL="742950" lvl="1" indent="-285750">
-              <a:buFont typeface="Arial" panose="020B0604020202020204" pitchFamily="34" charset="0"/>
-              <a:buChar char="•"/>
-            </a:pPr>
-            <a:r>
-              <a:rPr lang="en-US" sz="7200" dirty="0"/>
-              <a:t>Prevalence × Population × Coverage Correction × Incidence Correction Factor</a:t>
-            </a:r>
-          </a:p>
-          <a:p>
-            <a:pPr>
-              <a:buFont typeface="Arial" panose="020B0604020202020204" pitchFamily="34" charset="0"/>
-              <a:buChar char="•"/>
-            </a:pPr>
-            <a:r>
-              <a:rPr lang="en-US" sz="7200" b="1" dirty="0"/>
-              <a:t>Seasonal Analysis</a:t>
-            </a:r>
-            <a:endParaRPr lang="en-US" sz="7200" dirty="0"/>
-          </a:p>
-          <a:p>
-            <a:pPr marL="742950" lvl="1" indent="-285750">
-              <a:buFont typeface="Arial" panose="020B0604020202020204" pitchFamily="34" charset="0"/>
-              <a:buChar char="•"/>
-            </a:pPr>
-            <a:r>
-              <a:rPr lang="en-US" sz="7200" dirty="0"/>
-              <a:t>Disaggregation by season (e.g., lean season, harvest season)</a:t>
-            </a:r>
-          </a:p>
-          <a:p>
-            <a:pPr marL="742950" lvl="1" indent="-285750">
-              <a:buFont typeface="Arial" panose="020B0604020202020204" pitchFamily="34" charset="0"/>
-              <a:buChar char="•"/>
-            </a:pPr>
-            <a:r>
-              <a:rPr lang="en-US" sz="7200" dirty="0"/>
-              <a:t>Geographic variation</a:t>
-            </a:r>
-          </a:p>
-          <a:p>
-            <a:pPr>
-              <a:buNone/>
-            </a:pPr>
-            <a:r>
-              <a:rPr lang="en-US" sz="7200" b="1" dirty="0"/>
-              <a:t>4. Results – Children 6–59 Months (SAM)</a:t>
-            </a:r>
-          </a:p>
-          <a:p>
-            <a:pPr>
-              <a:buFont typeface="Arial" panose="020B0604020202020204" pitchFamily="34" charset="0"/>
-              <a:buChar char="•"/>
-            </a:pPr>
-            <a:r>
-              <a:rPr lang="en-US" sz="7200" b="1" dirty="0"/>
-              <a:t>Total Caseload Estimates by Season</a:t>
-            </a:r>
-            <a:endParaRPr lang="en-US" sz="7200" dirty="0"/>
-          </a:p>
-          <a:p>
-            <a:pPr>
-              <a:buFont typeface="Arial" panose="020B0604020202020204" pitchFamily="34" charset="0"/>
-              <a:buChar char="•"/>
-            </a:pPr>
-            <a:r>
-              <a:rPr lang="en-US" sz="7200" b="1" dirty="0"/>
-              <a:t>Seasonal Trends</a:t>
-            </a:r>
-            <a:endParaRPr lang="en-US" sz="7200" dirty="0"/>
-          </a:p>
-          <a:p>
-            <a:pPr marL="742950" lvl="1" indent="-285750">
-              <a:buFont typeface="Arial" panose="020B0604020202020204" pitchFamily="34" charset="0"/>
-              <a:buChar char="•"/>
-            </a:pPr>
-            <a:r>
-              <a:rPr lang="en-US" sz="7200" dirty="0"/>
-              <a:t>Peaks in lean seasons (e.g., pre-harvest)</a:t>
-            </a:r>
-          </a:p>
-          <a:p>
-            <a:pPr>
-              <a:buFont typeface="Arial" panose="020B0604020202020204" pitchFamily="34" charset="0"/>
-              <a:buChar char="•"/>
-            </a:pPr>
-            <a:r>
-              <a:rPr lang="en-US" sz="7200" b="1" dirty="0"/>
-              <a:t>Hotspot Areas</a:t>
-            </a:r>
-            <a:endParaRPr lang="en-US" sz="7200" dirty="0"/>
-          </a:p>
-          <a:p>
-            <a:pPr marL="742950" lvl="1" indent="-285750">
-              <a:buFont typeface="Arial" panose="020B0604020202020204" pitchFamily="34" charset="0"/>
-              <a:buChar char="•"/>
-            </a:pPr>
-            <a:r>
-              <a:rPr lang="en-US" sz="7200" dirty="0"/>
-              <a:t>Sub-national breakdown (map/graphs)</a:t>
-            </a:r>
-          </a:p>
-          <a:p>
-            <a:pPr>
-              <a:buFont typeface="Arial" panose="020B0604020202020204" pitchFamily="34" charset="0"/>
-              <a:buChar char="•"/>
-            </a:pPr>
-            <a:r>
-              <a:rPr lang="en-US" sz="7200" b="1" dirty="0"/>
-              <a:t>Comparisons Across Years (if available)</a:t>
-            </a:r>
-          </a:p>
-          <a:p>
-            <a:pPr>
-              <a:buFont typeface="Arial" panose="020B0604020202020204" pitchFamily="34" charset="0"/>
-              <a:buChar char="•"/>
-            </a:pPr>
-            <a:endParaRPr lang="en-US" sz="7200" b="1" dirty="0"/>
-          </a:p>
-          <a:p>
-            <a:pPr>
-              <a:buNone/>
-            </a:pPr>
-            <a:r>
-              <a:rPr lang="en-US" b="1" dirty="0"/>
-              <a:t>5. Results – Children 0–5 Months at Risk</a:t>
-            </a:r>
-          </a:p>
-          <a:p>
-            <a:pPr>
-              <a:buFont typeface="Arial" panose="020B0604020202020204" pitchFamily="34" charset="0"/>
-              <a:buChar char="•"/>
-            </a:pPr>
-            <a:r>
-              <a:rPr lang="en-US" b="1" dirty="0"/>
-              <a:t>Caseload Estimates</a:t>
-            </a:r>
-            <a:endParaRPr lang="en-US" dirty="0"/>
-          </a:p>
-          <a:p>
-            <a:pPr marL="742950" lvl="1" indent="-285750">
-              <a:buFont typeface="Arial" panose="020B0604020202020204" pitchFamily="34" charset="0"/>
-              <a:buChar char="•"/>
-            </a:pPr>
             <a:r>
               <a:rPr lang="en-US" dirty="0"/>
-              <a:t>Challenges in data availability</a:t>
-            </a:r>
-          </a:p>
-          <a:p>
-            <a:pPr>
-              <a:buFont typeface="Arial" panose="020B0604020202020204" pitchFamily="34" charset="0"/>
-              <a:buChar char="•"/>
-            </a:pPr>
-            <a:r>
-              <a:rPr lang="en-US" b="1" dirty="0"/>
-              <a:t>Associated Risk Factors</a:t>
-            </a:r>
-            <a:endParaRPr lang="en-US" dirty="0"/>
-          </a:p>
-          <a:p>
-            <a:pPr marL="742950" lvl="1" indent="-285750">
-              <a:buFont typeface="Arial" panose="020B0604020202020204" pitchFamily="34" charset="0"/>
-              <a:buChar char="•"/>
-            </a:pPr>
-            <a:r>
-              <a:rPr lang="en-US" dirty="0"/>
-              <a:t>Low birth weight, feeding practices, maternal nutrition</a:t>
-            </a:r>
-          </a:p>
-          <a:p>
-            <a:pPr>
-              <a:buFont typeface="Arial" panose="020B0604020202020204" pitchFamily="34" charset="0"/>
-              <a:buChar char="•"/>
-            </a:pPr>
-            <a:r>
-              <a:rPr lang="en-US" b="1" dirty="0"/>
-              <a:t>Programmatic Gaps</a:t>
-            </a:r>
-            <a:endParaRPr lang="en-US" dirty="0"/>
-          </a:p>
-          <a:p>
-            <a:pPr>
-              <a:buNone/>
-            </a:pPr>
-            <a:r>
-              <a:rPr lang="en-US" b="1" dirty="0"/>
-              <a:t>6. Implications for Programming</a:t>
-            </a:r>
-          </a:p>
-          <a:p>
-            <a:pPr>
-              <a:buFont typeface="Arial" panose="020B0604020202020204" pitchFamily="34" charset="0"/>
-              <a:buChar char="•"/>
-            </a:pPr>
-            <a:r>
-              <a:rPr lang="en-US" b="1" dirty="0"/>
-              <a:t>Preparedness for Peak Periods</a:t>
-            </a:r>
-            <a:endParaRPr lang="en-US" dirty="0"/>
-          </a:p>
-          <a:p>
-            <a:pPr marL="742950" lvl="1" indent="-285750">
-              <a:buFont typeface="Arial" panose="020B0604020202020204" pitchFamily="34" charset="0"/>
-              <a:buChar char="•"/>
-            </a:pPr>
-            <a:r>
-              <a:rPr lang="en-US" dirty="0"/>
-              <a:t>Stockpiling of therapeutic foods</a:t>
-            </a:r>
-          </a:p>
-          <a:p>
-            <a:pPr marL="742950" lvl="1" indent="-285750">
-              <a:buFont typeface="Arial" panose="020B0604020202020204" pitchFamily="34" charset="0"/>
-              <a:buChar char="•"/>
-            </a:pPr>
-            <a:r>
-              <a:rPr lang="en-US" dirty="0"/>
-              <a:t>Surge staffing and outreach</a:t>
-            </a:r>
-          </a:p>
-          <a:p>
-            <a:pPr>
-              <a:buFont typeface="Arial" panose="020B0604020202020204" pitchFamily="34" charset="0"/>
-              <a:buChar char="•"/>
-            </a:pPr>
-            <a:r>
-              <a:rPr lang="en-US" b="1" dirty="0"/>
-              <a:t>Integrated Interventions</a:t>
-            </a:r>
-            <a:endParaRPr lang="en-US" dirty="0"/>
-          </a:p>
-          <a:p>
-            <a:pPr marL="742950" lvl="1" indent="-285750">
-              <a:buFont typeface="Arial" panose="020B0604020202020204" pitchFamily="34" charset="0"/>
-              <a:buChar char="•"/>
-            </a:pPr>
-            <a:r>
-              <a:rPr lang="en-US" dirty="0"/>
-              <a:t>CMAM programs for SAM</a:t>
-            </a:r>
-          </a:p>
-          <a:p>
-            <a:pPr marL="742950" lvl="1" indent="-285750">
-              <a:buFont typeface="Arial" panose="020B0604020202020204" pitchFamily="34" charset="0"/>
-              <a:buChar char="•"/>
-            </a:pPr>
-            <a:r>
-              <a:rPr lang="en-US" dirty="0"/>
-              <a:t>Early intervention for at-risk infants</a:t>
-            </a:r>
-          </a:p>
-          <a:p>
-            <a:pPr>
-              <a:buFont typeface="Arial" panose="020B0604020202020204" pitchFamily="34" charset="0"/>
-              <a:buChar char="•"/>
-            </a:pPr>
-            <a:r>
-              <a:rPr lang="en-US" b="1" dirty="0"/>
-              <a:t>Coordination Needs</a:t>
-            </a:r>
-            <a:endParaRPr lang="en-US" dirty="0"/>
-          </a:p>
-          <a:p>
-            <a:pPr marL="742950" lvl="1" indent="-285750">
-              <a:buFont typeface="Arial" panose="020B0604020202020204" pitchFamily="34" charset="0"/>
-              <a:buChar char="•"/>
-            </a:pPr>
-            <a:r>
-              <a:rPr lang="en-US" dirty="0"/>
-              <a:t>Linking with maternal health, IYCF, ECD programs</a:t>
-            </a:r>
-          </a:p>
-          <a:p>
-            <a:pPr>
-              <a:buNone/>
-            </a:pPr>
-            <a:r>
-              <a:rPr lang="en-US" b="1" dirty="0"/>
-              <a:t>7. Recommendations</a:t>
-            </a:r>
-          </a:p>
-          <a:p>
-            <a:pPr>
-              <a:buFont typeface="Arial" panose="020B0604020202020204" pitchFamily="34" charset="0"/>
-              <a:buChar char="•"/>
-            </a:pPr>
-            <a:r>
-              <a:rPr lang="en-US" b="1" dirty="0"/>
-              <a:t>Short-term</a:t>
-            </a:r>
-            <a:endParaRPr lang="en-US" dirty="0"/>
-          </a:p>
-          <a:p>
-            <a:pPr marL="742950" lvl="1" indent="-285750">
-              <a:buFont typeface="Arial" panose="020B0604020202020204" pitchFamily="34" charset="0"/>
-              <a:buChar char="•"/>
-            </a:pPr>
-            <a:r>
-              <a:rPr lang="en-US" dirty="0"/>
-              <a:t>Pre-positioning supplies before peak seasons</a:t>
-            </a:r>
-          </a:p>
-          <a:p>
-            <a:pPr marL="742950" lvl="1" indent="-285750">
-              <a:buFont typeface="Arial" panose="020B0604020202020204" pitchFamily="34" charset="0"/>
-              <a:buChar char="•"/>
-            </a:pPr>
-            <a:r>
-              <a:rPr lang="en-US" dirty="0"/>
-              <a:t>Strengthen screening and referrals</a:t>
-            </a:r>
-          </a:p>
-          <a:p>
-            <a:pPr>
-              <a:buFont typeface="Arial" panose="020B0604020202020204" pitchFamily="34" charset="0"/>
-              <a:buChar char="•"/>
-            </a:pPr>
-            <a:r>
-              <a:rPr lang="en-US" b="1" dirty="0"/>
-              <a:t>Long-term</a:t>
-            </a:r>
-            <a:endParaRPr lang="en-US" dirty="0"/>
-          </a:p>
-          <a:p>
-            <a:pPr marL="742950" lvl="1" indent="-285750">
-              <a:buFont typeface="Arial" panose="020B0604020202020204" pitchFamily="34" charset="0"/>
-              <a:buChar char="•"/>
-            </a:pPr>
-            <a:r>
-              <a:rPr lang="en-US" dirty="0"/>
-              <a:t>Improve data for 0–5 months group</a:t>
-            </a:r>
-          </a:p>
-          <a:p>
-            <a:pPr marL="742950" lvl="1" indent="-285750">
-              <a:buFont typeface="Arial" panose="020B0604020202020204" pitchFamily="34" charset="0"/>
-              <a:buChar char="•"/>
-            </a:pPr>
-            <a:r>
-              <a:rPr lang="en-US" dirty="0"/>
-              <a:t>Integrate risk monitoring into routine systems</a:t>
-            </a:r>
-          </a:p>
-          <a:p>
-            <a:pPr>
-              <a:buNone/>
-            </a:pPr>
-            <a:r>
-              <a:rPr lang="en-US" b="1" dirty="0"/>
-              <a:t>8. Conclusion</a:t>
-            </a:r>
-          </a:p>
-          <a:p>
-            <a:pPr>
-              <a:buFont typeface="Arial" panose="020B0604020202020204" pitchFamily="34" charset="0"/>
-              <a:buChar char="•"/>
-            </a:pPr>
-            <a:r>
-              <a:rPr lang="en-US" b="1" dirty="0"/>
-              <a:t>Summary of Key Findings</a:t>
-            </a:r>
-            <a:endParaRPr lang="en-US" dirty="0"/>
-          </a:p>
-          <a:p>
-            <a:pPr>
-              <a:buFont typeface="Arial" panose="020B0604020202020204" pitchFamily="34" charset="0"/>
-              <a:buChar char="•"/>
-            </a:pPr>
-            <a:r>
-              <a:rPr lang="en-US" b="1" dirty="0"/>
-              <a:t>Call to Action</a:t>
-            </a:r>
-            <a:endParaRPr lang="en-US" dirty="0"/>
-          </a:p>
-          <a:p>
-            <a:pPr marL="742950" lvl="1" indent="-285750">
-              <a:buFont typeface="Arial" panose="020B0604020202020204" pitchFamily="34" charset="0"/>
-              <a:buChar char="•"/>
-            </a:pPr>
-            <a:r>
-              <a:rPr lang="en-US" dirty="0"/>
-              <a:t>Use seasonal trends for more responsive programming</a:t>
-            </a:r>
-          </a:p>
-          <a:p>
-            <a:pPr marL="742950" lvl="1" indent="-285750">
-              <a:buFont typeface="Arial" panose="020B0604020202020204" pitchFamily="34" charset="0"/>
-              <a:buChar char="•"/>
-            </a:pPr>
-            <a:r>
-              <a:rPr lang="en-US" dirty="0"/>
-              <a:t>Invest in early detection and prevention</a:t>
-            </a:r>
-          </a:p>
-          <a:p>
-            <a:pPr>
-              <a:buNone/>
-            </a:pPr>
-            <a:r>
-              <a:rPr lang="en-US" b="1" dirty="0"/>
-              <a:t>9. Annex (Optional Slides)</a:t>
-            </a:r>
-          </a:p>
-          <a:p>
-            <a:pPr>
-              <a:buFont typeface="Arial" panose="020B0604020202020204" pitchFamily="34" charset="0"/>
-              <a:buChar char="•"/>
-            </a:pPr>
-            <a:r>
-              <a:rPr lang="en-US" dirty="0"/>
-              <a:t>Methodological assumptions</a:t>
-            </a:r>
-          </a:p>
-          <a:p>
-            <a:pPr>
-              <a:buFont typeface="Arial" panose="020B0604020202020204" pitchFamily="34" charset="0"/>
-              <a:buChar char="•"/>
-            </a:pPr>
-            <a:r>
-              <a:rPr lang="en-US" dirty="0"/>
-              <a:t>Full data tables</a:t>
-            </a:r>
-          </a:p>
-          <a:p>
-            <a:pPr>
-              <a:buFont typeface="Arial" panose="020B0604020202020204" pitchFamily="34" charset="0"/>
-              <a:buChar char="•"/>
-            </a:pPr>
-            <a:r>
-              <a:rPr lang="en-US" dirty="0"/>
-              <a:t>Maps or heat charts</a:t>
-            </a:r>
-          </a:p>
-          <a:p>
-            <a:pPr>
-              <a:buFont typeface="Arial" panose="020B0604020202020204" pitchFamily="34" charset="0"/>
-              <a:buChar char="•"/>
-            </a:pPr>
-            <a:endParaRPr lang="en-US" sz="7200" dirty="0"/>
-          </a:p>
-          <a:p>
-            <a:pPr marL="0" indent="0">
-              <a:buNone/>
-            </a:pPr>
-            <a:endParaRPr lang="en-US" dirty="0"/>
-          </a:p>
-          <a:p>
-            <a:endParaRPr lang="en-US" dirty="0"/>
+              <a:t>Hypothesis</a:t>
+            </a:r>
           </a:p>
         </p:txBody>
       </p:sp>
@@ -2048,7 +1459,741 @@
           <a:p>
             <a:fld id="{B4B6109E-FE48-42FE-8789-E0CAF1EE0661}" type="slidenum">
               <a:rPr lang="en-US" smtClean="0"/>
-              <a:t>14</a:t>
+              <a:t>12</a:t>
+            </a:fld>
+            <a:endParaRPr lang="en-US"/>
+          </a:p>
+        </p:txBody>
+      </p:sp>
+    </p:spTree>
+    <p:extLst>
+      <p:ext uri="{BB962C8B-B14F-4D97-AF65-F5344CB8AC3E}">
+        <p14:creationId xmlns:p14="http://schemas.microsoft.com/office/powerpoint/2010/main" val="2243066256"/>
+      </p:ext>
+    </p:extLst>
+  </p:cSld>
+  <p:clrMapOvr>
+    <a:masterClrMapping/>
+  </p:clrMapOvr>
+</p:notes>
+</file>
+
+<file path=ppt/notesSlides/notesSlide8.xml><?xml version="1.0" encoding="utf-8"?>
+<p:notes xmlns:a="http://schemas.openxmlformats.org/drawingml/2006/main" xmlns:r="http://schemas.openxmlformats.org/officeDocument/2006/relationships" xmlns:p="http://schemas.openxmlformats.org/presentationml/2006/main">
+  <p:cSld>
+    <p:spTree>
+      <p:nvGrpSpPr>
+        <p:cNvPr id="1" name=""/>
+        <p:cNvGrpSpPr/>
+        <p:nvPr/>
+      </p:nvGrpSpPr>
+      <p:grpSpPr>
+        <a:xfrm>
+          <a:off x="0" y="0"/>
+          <a:ext cx="0" cy="0"/>
+          <a:chOff x="0" y="0"/>
+          <a:chExt cx="0" cy="0"/>
+        </a:xfrm>
+      </p:grpSpPr>
+      <p:sp>
+        <p:nvSpPr>
+          <p:cNvPr id="2" name="Slide Image Placeholder 1"/>
+          <p:cNvSpPr>
+            <a:spLocks noGrp="1" noRot="1" noChangeAspect="1"/>
+          </p:cNvSpPr>
+          <p:nvPr>
+            <p:ph type="sldImg"/>
+          </p:nvPr>
+        </p:nvSpPr>
+        <p:spPr/>
+      </p:sp>
+      <p:sp>
+        <p:nvSpPr>
+          <p:cNvPr id="3" name="Notes Placeholder 2"/>
+          <p:cNvSpPr>
+            <a:spLocks noGrp="1"/>
+          </p:cNvSpPr>
+          <p:nvPr>
+            <p:ph type="body" idx="1"/>
+          </p:nvPr>
+        </p:nvSpPr>
+        <p:spPr/>
+        <p:txBody>
+          <a:bodyPr/>
+          <a:lstStyle/>
+          <a:p>
+            <a:pPr>
+              <a:buNone/>
+            </a:pPr>
+            <a:r>
+              <a:rPr lang="en-US" sz="7200" b="1" dirty="0"/>
+              <a:t>Presentation Title:</a:t>
+            </a:r>
+          </a:p>
+          <a:p>
+            <a:pPr>
+              <a:buNone/>
+            </a:pPr>
+            <a:r>
+              <a:rPr lang="en-US" sz="7200" b="1" dirty="0"/>
+              <a:t>Seasonal Caseload Estimates of At-Risk Children: 0–59 Months</a:t>
+            </a:r>
+            <a:endParaRPr lang="en-US" sz="7200" dirty="0"/>
+          </a:p>
+          <a:p>
+            <a:pPr>
+              <a:buNone/>
+            </a:pPr>
+            <a:r>
+              <a:rPr lang="en-US" sz="7200" b="1" dirty="0"/>
+              <a:t>1. Introduction</a:t>
+            </a:r>
+          </a:p>
+          <a:p>
+            <a:pPr>
+              <a:buFont typeface="Arial" panose="020B0604020202020204" pitchFamily="34" charset="0"/>
+              <a:buChar char="•"/>
+            </a:pPr>
+            <a:r>
+              <a:rPr lang="en-US" sz="7200" b="1" dirty="0"/>
+              <a:t>Objective of the Presentation</a:t>
+            </a:r>
+            <a:endParaRPr lang="en-US" sz="7200" dirty="0"/>
+          </a:p>
+          <a:p>
+            <a:pPr marL="742950" lvl="1" indent="-285750">
+              <a:buFont typeface="Arial" panose="020B0604020202020204" pitchFamily="34" charset="0"/>
+              <a:buChar char="•"/>
+            </a:pPr>
+            <a:r>
+              <a:rPr lang="en-US" sz="7200" dirty="0"/>
+              <a:t>To present seasonal caseload estimates for children with SAM (6–59 months)</a:t>
+            </a:r>
+          </a:p>
+          <a:p>
+            <a:pPr marL="742950" lvl="1" indent="-285750">
+              <a:buFont typeface="Arial" panose="020B0604020202020204" pitchFamily="34" charset="0"/>
+              <a:buChar char="•"/>
+            </a:pPr>
+            <a:r>
+              <a:rPr lang="en-US" sz="7200" dirty="0"/>
+              <a:t>To highlight risk burden among infants 0–5 months</a:t>
+            </a:r>
+          </a:p>
+          <a:p>
+            <a:pPr>
+              <a:buFont typeface="Arial" panose="020B0604020202020204" pitchFamily="34" charset="0"/>
+              <a:buChar char="•"/>
+            </a:pPr>
+            <a:r>
+              <a:rPr lang="en-US" sz="7200" b="1" dirty="0"/>
+              <a:t>Why It Matters</a:t>
+            </a:r>
+            <a:endParaRPr lang="en-US" sz="7200" dirty="0"/>
+          </a:p>
+          <a:p>
+            <a:pPr marL="742950" lvl="1" indent="-285750">
+              <a:buFont typeface="Arial" panose="020B0604020202020204" pitchFamily="34" charset="0"/>
+              <a:buChar char="•"/>
+            </a:pPr>
+            <a:r>
+              <a:rPr lang="en-US" sz="7200" dirty="0"/>
+              <a:t>Malnutrition remains a major cause of child mortality</a:t>
+            </a:r>
+          </a:p>
+          <a:p>
+            <a:pPr marL="742950" lvl="1" indent="-285750">
+              <a:buFont typeface="Arial" panose="020B0604020202020204" pitchFamily="34" charset="0"/>
+              <a:buChar char="•"/>
+            </a:pPr>
+            <a:r>
+              <a:rPr lang="en-US" sz="7200" dirty="0"/>
+              <a:t>Timely planning is essential for seasonal peaks</a:t>
+            </a:r>
+          </a:p>
+          <a:p>
+            <a:pPr>
+              <a:buNone/>
+            </a:pPr>
+            <a:r>
+              <a:rPr lang="en-US" sz="7200" b="1" dirty="0"/>
+              <a:t>2. Background and Definitions</a:t>
+            </a:r>
+          </a:p>
+          <a:p>
+            <a:pPr>
+              <a:buFont typeface="Arial" panose="020B0604020202020204" pitchFamily="34" charset="0"/>
+              <a:buChar char="•"/>
+            </a:pPr>
+            <a:r>
+              <a:rPr lang="en-US" sz="7200" b="1" dirty="0"/>
+              <a:t>Severe Acute Malnutrition (SAM)</a:t>
+            </a:r>
+            <a:endParaRPr lang="en-US" sz="7200" dirty="0"/>
+          </a:p>
+          <a:p>
+            <a:pPr marL="742950" lvl="1" indent="-285750">
+              <a:buFont typeface="Arial" panose="020B0604020202020204" pitchFamily="34" charset="0"/>
+              <a:buChar char="•"/>
+            </a:pPr>
+            <a:r>
+              <a:rPr lang="en-US" sz="7200" dirty="0"/>
+              <a:t>Definition and criteria (e.g., WHZ &lt;-3, MUAC &lt;115 mm, or nutritional edema)</a:t>
+            </a:r>
+          </a:p>
+          <a:p>
+            <a:pPr marL="742950" lvl="1" indent="-285750">
+              <a:buFont typeface="Arial" panose="020B0604020202020204" pitchFamily="34" charset="0"/>
+              <a:buChar char="•"/>
+            </a:pPr>
+            <a:r>
+              <a:rPr lang="en-US" sz="7200" dirty="0"/>
+              <a:t>Impact on child mortality and development</a:t>
+            </a:r>
+          </a:p>
+          <a:p>
+            <a:pPr>
+              <a:buFont typeface="Arial" panose="020B0604020202020204" pitchFamily="34" charset="0"/>
+              <a:buChar char="•"/>
+            </a:pPr>
+            <a:r>
+              <a:rPr lang="en-US" sz="7200" b="1" dirty="0"/>
+              <a:t>Children 0–5 Months at Risk of Poor Growth</a:t>
+            </a:r>
+            <a:endParaRPr lang="en-US" sz="7200" dirty="0"/>
+          </a:p>
+          <a:p>
+            <a:pPr marL="742950" lvl="1" indent="-285750">
+              <a:buFont typeface="Arial" panose="020B0604020202020204" pitchFamily="34" charset="0"/>
+              <a:buChar char="•"/>
+            </a:pPr>
+            <a:r>
+              <a:rPr lang="en-US" sz="7200" dirty="0"/>
+              <a:t>Definition of “at-risk” (e.g., low weight-for-age, feeding issues, low MUAC)</a:t>
+            </a:r>
+          </a:p>
+          <a:p>
+            <a:pPr marL="742950" lvl="1" indent="-285750">
+              <a:buFont typeface="Arial" panose="020B0604020202020204" pitchFamily="34" charset="0"/>
+              <a:buChar char="•"/>
+            </a:pPr>
+            <a:r>
+              <a:rPr lang="en-US" sz="7200" dirty="0"/>
+              <a:t>Importance of early identification</a:t>
+            </a:r>
+          </a:p>
+          <a:p>
+            <a:pPr>
+              <a:buNone/>
+            </a:pPr>
+            <a:r>
+              <a:rPr lang="en-US" sz="7200" b="1" dirty="0"/>
+              <a:t>3. Data Sources and Methodology</a:t>
+            </a:r>
+          </a:p>
+          <a:p>
+            <a:pPr>
+              <a:buFont typeface="Arial" panose="020B0604020202020204" pitchFamily="34" charset="0"/>
+              <a:buChar char="•"/>
+            </a:pPr>
+            <a:r>
+              <a:rPr lang="en-US" sz="7200" b="1" dirty="0"/>
+              <a:t>Survey Data</a:t>
+            </a:r>
+            <a:endParaRPr lang="en-US" sz="7200" dirty="0"/>
+          </a:p>
+          <a:p>
+            <a:pPr marL="742950" lvl="1" indent="-285750">
+              <a:buFont typeface="Arial" panose="020B0604020202020204" pitchFamily="34" charset="0"/>
+              <a:buChar char="•"/>
+            </a:pPr>
+            <a:r>
+              <a:rPr lang="en-US" sz="7200" dirty="0"/>
+              <a:t>Sources (e.g., SMART surveys, DHS, MICS, HMIS)</a:t>
+            </a:r>
+          </a:p>
+          <a:p>
+            <a:pPr>
+              <a:buFont typeface="Arial" panose="020B0604020202020204" pitchFamily="34" charset="0"/>
+              <a:buChar char="•"/>
+            </a:pPr>
+            <a:r>
+              <a:rPr lang="en-US" sz="7200" b="1" dirty="0"/>
+              <a:t>Caseload Estimation Formula</a:t>
+            </a:r>
+            <a:endParaRPr lang="en-US" sz="7200" dirty="0"/>
+          </a:p>
+          <a:p>
+            <a:pPr marL="742950" lvl="1" indent="-285750">
+              <a:buFont typeface="Arial" panose="020B0604020202020204" pitchFamily="34" charset="0"/>
+              <a:buChar char="•"/>
+            </a:pPr>
+            <a:r>
+              <a:rPr lang="en-US" sz="7200" dirty="0"/>
+              <a:t>Prevalence × Population × Coverage Correction × Incidence Correction Factor</a:t>
+            </a:r>
+          </a:p>
+          <a:p>
+            <a:pPr>
+              <a:buFont typeface="Arial" panose="020B0604020202020204" pitchFamily="34" charset="0"/>
+              <a:buChar char="•"/>
+            </a:pPr>
+            <a:r>
+              <a:rPr lang="en-US" sz="7200" b="1" dirty="0"/>
+              <a:t>Seasonal Analysis</a:t>
+            </a:r>
+            <a:endParaRPr lang="en-US" sz="7200" dirty="0"/>
+          </a:p>
+          <a:p>
+            <a:pPr marL="742950" lvl="1" indent="-285750">
+              <a:buFont typeface="Arial" panose="020B0604020202020204" pitchFamily="34" charset="0"/>
+              <a:buChar char="•"/>
+            </a:pPr>
+            <a:r>
+              <a:rPr lang="en-US" sz="7200" dirty="0"/>
+              <a:t>Disaggregation by season (e.g., lean season, harvest season)</a:t>
+            </a:r>
+          </a:p>
+          <a:p>
+            <a:pPr marL="742950" lvl="1" indent="-285750">
+              <a:buFont typeface="Arial" panose="020B0604020202020204" pitchFamily="34" charset="0"/>
+              <a:buChar char="•"/>
+            </a:pPr>
+            <a:r>
+              <a:rPr lang="en-US" sz="7200" dirty="0"/>
+              <a:t>Geographic variation</a:t>
+            </a:r>
+          </a:p>
+          <a:p>
+            <a:pPr>
+              <a:buNone/>
+            </a:pPr>
+            <a:r>
+              <a:rPr lang="en-US" sz="7200" b="1" dirty="0"/>
+              <a:t>4. Results – Children 6–59 Months (SAM)</a:t>
+            </a:r>
+          </a:p>
+          <a:p>
+            <a:pPr>
+              <a:buFont typeface="Arial" panose="020B0604020202020204" pitchFamily="34" charset="0"/>
+              <a:buChar char="•"/>
+            </a:pPr>
+            <a:r>
+              <a:rPr lang="en-US" sz="7200" b="1" dirty="0"/>
+              <a:t>Total Caseload Estimates by Season</a:t>
+            </a:r>
+            <a:endParaRPr lang="en-US" sz="7200" dirty="0"/>
+          </a:p>
+          <a:p>
+            <a:pPr>
+              <a:buFont typeface="Arial" panose="020B0604020202020204" pitchFamily="34" charset="0"/>
+              <a:buChar char="•"/>
+            </a:pPr>
+            <a:r>
+              <a:rPr lang="en-US" sz="7200" b="1" dirty="0"/>
+              <a:t>Seasonal Trends</a:t>
+            </a:r>
+            <a:endParaRPr lang="en-US" sz="7200" dirty="0"/>
+          </a:p>
+          <a:p>
+            <a:pPr marL="742950" lvl="1" indent="-285750">
+              <a:buFont typeface="Arial" panose="020B0604020202020204" pitchFamily="34" charset="0"/>
+              <a:buChar char="•"/>
+            </a:pPr>
+            <a:r>
+              <a:rPr lang="en-US" sz="7200" dirty="0"/>
+              <a:t>Peaks in lean seasons (e.g., pre-harvest)</a:t>
+            </a:r>
+          </a:p>
+          <a:p>
+            <a:pPr>
+              <a:buFont typeface="Arial" panose="020B0604020202020204" pitchFamily="34" charset="0"/>
+              <a:buChar char="•"/>
+            </a:pPr>
+            <a:r>
+              <a:rPr lang="en-US" sz="7200" b="1" dirty="0"/>
+              <a:t>Hotspot Areas</a:t>
+            </a:r>
+            <a:endParaRPr lang="en-US" sz="7200" dirty="0"/>
+          </a:p>
+          <a:p>
+            <a:pPr marL="742950" lvl="1" indent="-285750">
+              <a:buFont typeface="Arial" panose="020B0604020202020204" pitchFamily="34" charset="0"/>
+              <a:buChar char="•"/>
+            </a:pPr>
+            <a:r>
+              <a:rPr lang="en-US" sz="7200" dirty="0"/>
+              <a:t>Sub-national breakdown (map/graphs)</a:t>
+            </a:r>
+          </a:p>
+          <a:p>
+            <a:pPr>
+              <a:buFont typeface="Arial" panose="020B0604020202020204" pitchFamily="34" charset="0"/>
+              <a:buChar char="•"/>
+            </a:pPr>
+            <a:r>
+              <a:rPr lang="en-US" sz="7200" b="1" dirty="0"/>
+              <a:t>Comparisons Across Years (if available)</a:t>
+            </a:r>
+          </a:p>
+          <a:p>
+            <a:pPr>
+              <a:buFont typeface="Arial" panose="020B0604020202020204" pitchFamily="34" charset="0"/>
+              <a:buChar char="•"/>
+            </a:pPr>
+            <a:endParaRPr lang="en-US" sz="7200" b="1" dirty="0"/>
+          </a:p>
+          <a:p>
+            <a:pPr>
+              <a:buNone/>
+            </a:pPr>
+            <a:r>
+              <a:rPr lang="en-US" b="1" dirty="0"/>
+              <a:t>5. Results – Children 0–5 Months at Risk</a:t>
+            </a:r>
+          </a:p>
+          <a:p>
+            <a:pPr>
+              <a:buFont typeface="Arial" panose="020B0604020202020204" pitchFamily="34" charset="0"/>
+              <a:buChar char="•"/>
+            </a:pPr>
+            <a:r>
+              <a:rPr lang="en-US" b="1" dirty="0"/>
+              <a:t>Caseload Estimates</a:t>
+            </a:r>
+            <a:endParaRPr lang="en-US" dirty="0"/>
+          </a:p>
+          <a:p>
+            <a:pPr marL="742950" lvl="1" indent="-285750">
+              <a:buFont typeface="Arial" panose="020B0604020202020204" pitchFamily="34" charset="0"/>
+              <a:buChar char="•"/>
+            </a:pPr>
+            <a:r>
+              <a:rPr lang="en-US" dirty="0"/>
+              <a:t>Challenges in data availability</a:t>
+            </a:r>
+          </a:p>
+          <a:p>
+            <a:pPr>
+              <a:buFont typeface="Arial" panose="020B0604020202020204" pitchFamily="34" charset="0"/>
+              <a:buChar char="•"/>
+            </a:pPr>
+            <a:r>
+              <a:rPr lang="en-US" b="1" dirty="0"/>
+              <a:t>Associated Risk Factors</a:t>
+            </a:r>
+            <a:endParaRPr lang="en-US" dirty="0"/>
+          </a:p>
+          <a:p>
+            <a:pPr marL="742950" lvl="1" indent="-285750">
+              <a:buFont typeface="Arial" panose="020B0604020202020204" pitchFamily="34" charset="0"/>
+              <a:buChar char="•"/>
+            </a:pPr>
+            <a:r>
+              <a:rPr lang="en-US" dirty="0"/>
+              <a:t>Low birth weight, feeding practices, maternal nutrition</a:t>
+            </a:r>
+          </a:p>
+          <a:p>
+            <a:pPr>
+              <a:buFont typeface="Arial" panose="020B0604020202020204" pitchFamily="34" charset="0"/>
+              <a:buChar char="•"/>
+            </a:pPr>
+            <a:r>
+              <a:rPr lang="en-US" b="1" dirty="0"/>
+              <a:t>Programmatic Gaps</a:t>
+            </a:r>
+            <a:endParaRPr lang="en-US" dirty="0"/>
+          </a:p>
+          <a:p>
+            <a:pPr>
+              <a:buNone/>
+            </a:pPr>
+            <a:r>
+              <a:rPr lang="en-US" b="1" dirty="0"/>
+              <a:t>6. Implications for Programming</a:t>
+            </a:r>
+          </a:p>
+          <a:p>
+            <a:pPr>
+              <a:buFont typeface="Arial" panose="020B0604020202020204" pitchFamily="34" charset="0"/>
+              <a:buChar char="•"/>
+            </a:pPr>
+            <a:r>
+              <a:rPr lang="en-US" b="1" dirty="0"/>
+              <a:t>Preparedness for Peak Periods</a:t>
+            </a:r>
+            <a:endParaRPr lang="en-US" dirty="0"/>
+          </a:p>
+          <a:p>
+            <a:pPr marL="742950" lvl="1" indent="-285750">
+              <a:buFont typeface="Arial" panose="020B0604020202020204" pitchFamily="34" charset="0"/>
+              <a:buChar char="•"/>
+            </a:pPr>
+            <a:r>
+              <a:rPr lang="en-US" dirty="0"/>
+              <a:t>Stockpiling of therapeutic foods</a:t>
+            </a:r>
+          </a:p>
+          <a:p>
+            <a:pPr marL="742950" lvl="1" indent="-285750">
+              <a:buFont typeface="Arial" panose="020B0604020202020204" pitchFamily="34" charset="0"/>
+              <a:buChar char="•"/>
+            </a:pPr>
+            <a:r>
+              <a:rPr lang="en-US" dirty="0"/>
+              <a:t>Surge staffing and outreach</a:t>
+            </a:r>
+          </a:p>
+          <a:p>
+            <a:pPr>
+              <a:buFont typeface="Arial" panose="020B0604020202020204" pitchFamily="34" charset="0"/>
+              <a:buChar char="•"/>
+            </a:pPr>
+            <a:r>
+              <a:rPr lang="en-US" b="1" dirty="0"/>
+              <a:t>Integrated Interventions</a:t>
+            </a:r>
+            <a:endParaRPr lang="en-US" dirty="0"/>
+          </a:p>
+          <a:p>
+            <a:pPr marL="742950" lvl="1" indent="-285750">
+              <a:buFont typeface="Arial" panose="020B0604020202020204" pitchFamily="34" charset="0"/>
+              <a:buChar char="•"/>
+            </a:pPr>
+            <a:r>
+              <a:rPr lang="en-US" dirty="0"/>
+              <a:t>CMAM programs for SAM</a:t>
+            </a:r>
+          </a:p>
+          <a:p>
+            <a:pPr marL="742950" lvl="1" indent="-285750">
+              <a:buFont typeface="Arial" panose="020B0604020202020204" pitchFamily="34" charset="0"/>
+              <a:buChar char="•"/>
+            </a:pPr>
+            <a:r>
+              <a:rPr lang="en-US" dirty="0"/>
+              <a:t>Early intervention for at-risk infants</a:t>
+            </a:r>
+          </a:p>
+          <a:p>
+            <a:pPr>
+              <a:buFont typeface="Arial" panose="020B0604020202020204" pitchFamily="34" charset="0"/>
+              <a:buChar char="•"/>
+            </a:pPr>
+            <a:r>
+              <a:rPr lang="en-US" b="1" dirty="0"/>
+              <a:t>Coordination Needs</a:t>
+            </a:r>
+            <a:endParaRPr lang="en-US" dirty="0"/>
+          </a:p>
+          <a:p>
+            <a:pPr marL="742950" lvl="1" indent="-285750">
+              <a:buFont typeface="Arial" panose="020B0604020202020204" pitchFamily="34" charset="0"/>
+              <a:buChar char="•"/>
+            </a:pPr>
+            <a:r>
+              <a:rPr lang="en-US" dirty="0"/>
+              <a:t>Linking with maternal health, IYCF, ECD programs</a:t>
+            </a:r>
+          </a:p>
+          <a:p>
+            <a:pPr>
+              <a:buNone/>
+            </a:pPr>
+            <a:r>
+              <a:rPr lang="en-US" b="1" dirty="0"/>
+              <a:t>7. Recommendations</a:t>
+            </a:r>
+          </a:p>
+          <a:p>
+            <a:pPr>
+              <a:buFont typeface="Arial" panose="020B0604020202020204" pitchFamily="34" charset="0"/>
+              <a:buChar char="•"/>
+            </a:pPr>
+            <a:r>
+              <a:rPr lang="en-US" b="1" dirty="0"/>
+              <a:t>Short-term</a:t>
+            </a:r>
+            <a:endParaRPr lang="en-US" dirty="0"/>
+          </a:p>
+          <a:p>
+            <a:pPr marL="742950" lvl="1" indent="-285750">
+              <a:buFont typeface="Arial" panose="020B0604020202020204" pitchFamily="34" charset="0"/>
+              <a:buChar char="•"/>
+            </a:pPr>
+            <a:r>
+              <a:rPr lang="en-US" dirty="0"/>
+              <a:t>Pre-positioning supplies before peak seasons</a:t>
+            </a:r>
+          </a:p>
+          <a:p>
+            <a:pPr marL="742950" lvl="1" indent="-285750">
+              <a:buFont typeface="Arial" panose="020B0604020202020204" pitchFamily="34" charset="0"/>
+              <a:buChar char="•"/>
+            </a:pPr>
+            <a:r>
+              <a:rPr lang="en-US" dirty="0"/>
+              <a:t>Strengthen screening and referrals</a:t>
+            </a:r>
+          </a:p>
+          <a:p>
+            <a:pPr>
+              <a:buFont typeface="Arial" panose="020B0604020202020204" pitchFamily="34" charset="0"/>
+              <a:buChar char="•"/>
+            </a:pPr>
+            <a:r>
+              <a:rPr lang="en-US" b="1" dirty="0"/>
+              <a:t>Long-term</a:t>
+            </a:r>
+            <a:endParaRPr lang="en-US" dirty="0"/>
+          </a:p>
+          <a:p>
+            <a:pPr marL="742950" lvl="1" indent="-285750">
+              <a:buFont typeface="Arial" panose="020B0604020202020204" pitchFamily="34" charset="0"/>
+              <a:buChar char="•"/>
+            </a:pPr>
+            <a:r>
+              <a:rPr lang="en-US" dirty="0"/>
+              <a:t>Improve data for 0–5 months group</a:t>
+            </a:r>
+          </a:p>
+          <a:p>
+            <a:pPr marL="742950" lvl="1" indent="-285750">
+              <a:buFont typeface="Arial" panose="020B0604020202020204" pitchFamily="34" charset="0"/>
+              <a:buChar char="•"/>
+            </a:pPr>
+            <a:r>
+              <a:rPr lang="en-US" dirty="0"/>
+              <a:t>Integrate risk monitoring into routine systems</a:t>
+            </a:r>
+          </a:p>
+          <a:p>
+            <a:pPr>
+              <a:buNone/>
+            </a:pPr>
+            <a:r>
+              <a:rPr lang="en-US" b="1" dirty="0"/>
+              <a:t>8. Conclusion</a:t>
+            </a:r>
+          </a:p>
+          <a:p>
+            <a:pPr>
+              <a:buFont typeface="Arial" panose="020B0604020202020204" pitchFamily="34" charset="0"/>
+              <a:buChar char="•"/>
+            </a:pPr>
+            <a:r>
+              <a:rPr lang="en-US" b="1" dirty="0"/>
+              <a:t>Summary of Key Findings</a:t>
+            </a:r>
+            <a:endParaRPr lang="en-US" dirty="0"/>
+          </a:p>
+          <a:p>
+            <a:pPr>
+              <a:buFont typeface="Arial" panose="020B0604020202020204" pitchFamily="34" charset="0"/>
+              <a:buChar char="•"/>
+            </a:pPr>
+            <a:r>
+              <a:rPr lang="en-US" b="1" dirty="0"/>
+              <a:t>Call to Action</a:t>
+            </a:r>
+            <a:endParaRPr lang="en-US" dirty="0"/>
+          </a:p>
+          <a:p>
+            <a:pPr marL="742950" lvl="1" indent="-285750">
+              <a:buFont typeface="Arial" panose="020B0604020202020204" pitchFamily="34" charset="0"/>
+              <a:buChar char="•"/>
+            </a:pPr>
+            <a:r>
+              <a:rPr lang="en-US" dirty="0"/>
+              <a:t>Use seasonal trends for more responsive programming</a:t>
+            </a:r>
+          </a:p>
+          <a:p>
+            <a:pPr marL="742950" lvl="1" indent="-285750">
+              <a:buFont typeface="Arial" panose="020B0604020202020204" pitchFamily="34" charset="0"/>
+              <a:buChar char="•"/>
+            </a:pPr>
+            <a:r>
+              <a:rPr lang="en-US" dirty="0"/>
+              <a:t>Invest in early detection and prevention</a:t>
+            </a:r>
+          </a:p>
+          <a:p>
+            <a:pPr>
+              <a:buNone/>
+            </a:pPr>
+            <a:r>
+              <a:rPr lang="en-US" b="1" dirty="0"/>
+              <a:t>9. Annex (Optional Slides)</a:t>
+            </a:r>
+          </a:p>
+          <a:p>
+            <a:pPr>
+              <a:buFont typeface="Arial" panose="020B0604020202020204" pitchFamily="34" charset="0"/>
+              <a:buChar char="•"/>
+            </a:pPr>
+            <a:r>
+              <a:rPr lang="en-US" dirty="0"/>
+              <a:t>Methodological assumptions</a:t>
+            </a:r>
+          </a:p>
+          <a:p>
+            <a:pPr>
+              <a:buFont typeface="Arial" panose="020B0604020202020204" pitchFamily="34" charset="0"/>
+              <a:buChar char="•"/>
+            </a:pPr>
+            <a:r>
+              <a:rPr lang="en-US" dirty="0"/>
+              <a:t>Full data tables</a:t>
+            </a:r>
+          </a:p>
+          <a:p>
+            <a:pPr>
+              <a:buFont typeface="Arial" panose="020B0604020202020204" pitchFamily="34" charset="0"/>
+              <a:buChar char="•"/>
+            </a:pPr>
+            <a:r>
+              <a:rPr lang="en-US" dirty="0"/>
+              <a:t>Maps or heat charts</a:t>
+            </a:r>
+          </a:p>
+          <a:p>
+            <a:pPr>
+              <a:buFont typeface="Arial" panose="020B0604020202020204" pitchFamily="34" charset="0"/>
+              <a:buChar char="•"/>
+            </a:pPr>
+            <a:endParaRPr lang="en-US" sz="7200" dirty="0"/>
+          </a:p>
+          <a:p>
+            <a:pPr marL="0" indent="0">
+              <a:buNone/>
+            </a:pPr>
+            <a:endParaRPr lang="en-US" dirty="0"/>
+          </a:p>
+          <a:p>
+            <a:endParaRPr lang="en-US" dirty="0"/>
+          </a:p>
+        </p:txBody>
+      </p:sp>
+      <p:sp>
+        <p:nvSpPr>
+          <p:cNvPr id="4" name="Slide Number Placeholder 3"/>
+          <p:cNvSpPr>
+            <a:spLocks noGrp="1"/>
+          </p:cNvSpPr>
+          <p:nvPr>
+            <p:ph type="sldNum" sz="quarter" idx="5"/>
+          </p:nvPr>
+        </p:nvSpPr>
+        <p:spPr/>
+        <p:txBody>
+          <a:bodyPr/>
+          <a:lstStyle/>
+          <a:p>
+            <a:fld id="{B4B6109E-FE48-42FE-8789-E0CAF1EE0661}" type="slidenum">
+              <a:rPr lang="en-US" smtClean="0"/>
+              <a:t>15</a:t>
             </a:fld>
             <a:endParaRPr lang="en-US"/>
           </a:p>
@@ -2214,7 +2359,7 @@
           <a:p>
             <a:fld id="{7A0920A2-F505-4459-A6C8-D3165AA23904}" type="datetimeFigureOut">
               <a:rPr lang="en-US" smtClean="0"/>
-              <a:t>6/24/2025</a:t>
+              <a:t>6/25/2025</a:t>
             </a:fld>
             <a:endParaRPr lang="en-US"/>
           </a:p>
@@ -2412,7 +2557,7 @@
           <a:p>
             <a:fld id="{7A0920A2-F505-4459-A6C8-D3165AA23904}" type="datetimeFigureOut">
               <a:rPr lang="en-US" smtClean="0"/>
-              <a:t>6/24/2025</a:t>
+              <a:t>6/25/2025</a:t>
             </a:fld>
             <a:endParaRPr lang="en-US"/>
           </a:p>
@@ -2620,7 +2765,7 @@
           <a:p>
             <a:fld id="{7A0920A2-F505-4459-A6C8-D3165AA23904}" type="datetimeFigureOut">
               <a:rPr lang="en-US" smtClean="0"/>
-              <a:t>6/24/2025</a:t>
+              <a:t>6/25/2025</a:t>
             </a:fld>
             <a:endParaRPr lang="en-US"/>
           </a:p>
@@ -2818,7 +2963,7 @@
           <a:p>
             <a:fld id="{7A0920A2-F505-4459-A6C8-D3165AA23904}" type="datetimeFigureOut">
               <a:rPr lang="en-US" smtClean="0"/>
-              <a:t>6/24/2025</a:t>
+              <a:t>6/25/2025</a:t>
             </a:fld>
             <a:endParaRPr lang="en-US"/>
           </a:p>
@@ -3093,7 +3238,7 @@
           <a:p>
             <a:fld id="{7A0920A2-F505-4459-A6C8-D3165AA23904}" type="datetimeFigureOut">
               <a:rPr lang="en-US" smtClean="0"/>
-              <a:t>6/24/2025</a:t>
+              <a:t>6/25/2025</a:t>
             </a:fld>
             <a:endParaRPr lang="en-US"/>
           </a:p>
@@ -3358,7 +3503,7 @@
           <a:p>
             <a:fld id="{7A0920A2-F505-4459-A6C8-D3165AA23904}" type="datetimeFigureOut">
               <a:rPr lang="en-US" smtClean="0"/>
-              <a:t>6/24/2025</a:t>
+              <a:t>6/25/2025</a:t>
             </a:fld>
             <a:endParaRPr lang="en-US"/>
           </a:p>
@@ -3770,7 +3915,7 @@
           <a:p>
             <a:fld id="{7A0920A2-F505-4459-A6C8-D3165AA23904}" type="datetimeFigureOut">
               <a:rPr lang="en-US" smtClean="0"/>
-              <a:t>6/24/2025</a:t>
+              <a:t>6/25/2025</a:t>
             </a:fld>
             <a:endParaRPr lang="en-US"/>
           </a:p>
@@ -3911,7 +4056,7 @@
           <a:p>
             <a:fld id="{7A0920A2-F505-4459-A6C8-D3165AA23904}" type="datetimeFigureOut">
               <a:rPr lang="en-US" smtClean="0"/>
-              <a:t>6/24/2025</a:t>
+              <a:t>6/25/2025</a:t>
             </a:fld>
             <a:endParaRPr lang="en-US"/>
           </a:p>
@@ -4024,7 +4169,7 @@
           <a:p>
             <a:fld id="{7A0920A2-F505-4459-A6C8-D3165AA23904}" type="datetimeFigureOut">
               <a:rPr lang="en-US" smtClean="0"/>
-              <a:t>6/24/2025</a:t>
+              <a:t>6/25/2025</a:t>
             </a:fld>
             <a:endParaRPr lang="en-US"/>
           </a:p>
@@ -4335,7 +4480,7 @@
           <a:p>
             <a:fld id="{7A0920A2-F505-4459-A6C8-D3165AA23904}" type="datetimeFigureOut">
               <a:rPr lang="en-US" smtClean="0"/>
-              <a:t>6/24/2025</a:t>
+              <a:t>6/25/2025</a:t>
             </a:fld>
             <a:endParaRPr lang="en-US"/>
           </a:p>
@@ -4623,7 +4768,7 @@
           <a:p>
             <a:fld id="{7A0920A2-F505-4459-A6C8-D3165AA23904}" type="datetimeFigureOut">
               <a:rPr lang="en-US" smtClean="0"/>
-              <a:t>6/24/2025</a:t>
+              <a:t>6/25/2025</a:t>
             </a:fld>
             <a:endParaRPr lang="en-US"/>
           </a:p>
@@ -4864,7 +5009,7 @@
           <a:p>
             <a:fld id="{7A0920A2-F505-4459-A6C8-D3165AA23904}" type="datetimeFigureOut">
               <a:rPr lang="en-US" smtClean="0"/>
-              <a:t>6/24/2025</a:t>
+              <a:t>6/25/2025</a:t>
             </a:fld>
             <a:endParaRPr lang="en-US"/>
           </a:p>
@@ -5554,6 +5699,270 @@
           <a:chExt cx="0" cy="0"/>
         </a:xfrm>
       </p:grpSpPr>
+      <p:sp>
+        <p:nvSpPr>
+          <p:cNvPr id="2" name="Title 1">
+            <a:extLst>
+              <a:ext uri="{FF2B5EF4-FFF2-40B4-BE49-F238E27FC236}">
+                <a16:creationId xmlns:a16="http://schemas.microsoft.com/office/drawing/2014/main" id="{B0E28064-642E-E64D-9147-19DB74ED03C6}"/>
+              </a:ext>
+            </a:extLst>
+          </p:cNvPr>
+          <p:cNvSpPr>
+            <a:spLocks noGrp="1"/>
+          </p:cNvSpPr>
+          <p:nvPr>
+            <p:ph type="title"/>
+          </p:nvPr>
+        </p:nvSpPr>
+        <p:spPr/>
+        <p:txBody>
+          <a:bodyPr/>
+          <a:lstStyle/>
+          <a:p>
+            <a:r>
+              <a:rPr lang="en-US" dirty="0"/>
+              <a:t>The importance to use a seasonally adjusted estimate of wasting for annual planning</a:t>
+            </a:r>
+          </a:p>
+        </p:txBody>
+      </p:sp>
+      <p:sp>
+        <p:nvSpPr>
+          <p:cNvPr id="3" name="Content Placeholder 2">
+            <a:extLst>
+              <a:ext uri="{FF2B5EF4-FFF2-40B4-BE49-F238E27FC236}">
+                <a16:creationId xmlns:a16="http://schemas.microsoft.com/office/drawing/2014/main" id="{06E75016-E005-DDA6-4FB1-C68F52C9728D}"/>
+              </a:ext>
+            </a:extLst>
+          </p:cNvPr>
+          <p:cNvSpPr>
+            <a:spLocks noGrp="1"/>
+          </p:cNvSpPr>
+          <p:nvPr>
+            <p:ph idx="1"/>
+          </p:nvPr>
+        </p:nvSpPr>
+        <p:spPr>
+          <a:xfrm>
+            <a:off x="292130" y="1825625"/>
+            <a:ext cx="4838670" cy="4351338"/>
+          </a:xfrm>
+        </p:spPr>
+        <p:txBody>
+          <a:bodyPr>
+            <a:normAutofit/>
+          </a:bodyPr>
+          <a:lstStyle/>
+          <a:p>
+            <a:r>
+              <a:rPr lang="en-US" dirty="0"/>
+              <a:t>Seasonal peaks and troughs do not always correspond to common assumptions (especially when wasting presents twin peaks)</a:t>
+            </a:r>
+          </a:p>
+          <a:p>
+            <a:r>
+              <a:rPr lang="en-US" dirty="0"/>
+              <a:t>Use of data collected in February will underestimate the caseload.</a:t>
+            </a:r>
+          </a:p>
+          <a:p>
+            <a:r>
+              <a:rPr lang="en-US" dirty="0"/>
+              <a:t>Use of data collected in May will overestimate the caseload</a:t>
+            </a:r>
+          </a:p>
+          <a:p>
+            <a:endParaRPr lang="en-US" dirty="0"/>
+          </a:p>
+        </p:txBody>
+      </p:sp>
+      <p:pic>
+        <p:nvPicPr>
+          <p:cNvPr id="4" name="Picture 1" descr="A graph of a temperature&#10;&#10;AI-generated content may be incorrect.">
+            <a:extLst>
+              <a:ext uri="{FF2B5EF4-FFF2-40B4-BE49-F238E27FC236}">
+                <a16:creationId xmlns:a16="http://schemas.microsoft.com/office/drawing/2014/main" id="{CEAEEEC5-55AB-EB50-F17D-1F684AC49038}"/>
+              </a:ext>
+            </a:extLst>
+          </p:cNvPr>
+          <p:cNvPicPr>
+            <a:picLocks noChangeAspect="1" noChangeArrowheads="1"/>
+          </p:cNvPicPr>
+          <p:nvPr/>
+        </p:nvPicPr>
+        <p:blipFill>
+          <a:blip r:embed="rId2">
+            <a:extLst>
+              <a:ext uri="{28A0092B-C50C-407E-A947-70E740481C1C}">
+                <a14:useLocalDpi xmlns:a14="http://schemas.microsoft.com/office/drawing/2010/main" val="0"/>
+              </a:ext>
+            </a:extLst>
+          </a:blip>
+          <a:srcRect/>
+          <a:stretch>
+            <a:fillRect/>
+          </a:stretch>
+        </p:blipFill>
+        <p:spPr bwMode="auto">
+          <a:xfrm>
+            <a:off x="5717933" y="1825625"/>
+            <a:ext cx="6181937" cy="4537075"/>
+          </a:xfrm>
+          <a:prstGeom prst="rect">
+            <a:avLst/>
+          </a:prstGeom>
+          <a:noFill/>
+          <a:ln>
+            <a:noFill/>
+          </a:ln>
+          <a:extLst>
+            <a:ext uri="{909E8E84-426E-40DD-AFC4-6F175D3DCCD1}">
+              <a14:hiddenFill xmlns:a14="http://schemas.microsoft.com/office/drawing/2010/main">
+                <a:solidFill>
+                  <a:srgbClr val="FFFFFF"/>
+                </a:solidFill>
+              </a14:hiddenFill>
+            </a:ext>
+            <a:ext uri="{91240B29-F687-4F45-9708-019B960494DF}">
+              <a14:hiddenLine xmlns:a14="http://schemas.microsoft.com/office/drawing/2010/main" w="9525">
+                <a:solidFill>
+                  <a:srgbClr val="000000"/>
+                </a:solidFill>
+                <a:miter lim="800000"/>
+                <a:headEnd/>
+                <a:tailEnd/>
+              </a14:hiddenLine>
+            </a:ext>
+          </a:extLst>
+        </p:spPr>
+      </p:pic>
+      <p:sp>
+        <p:nvSpPr>
+          <p:cNvPr id="6" name="TextBox 5">
+            <a:extLst>
+              <a:ext uri="{FF2B5EF4-FFF2-40B4-BE49-F238E27FC236}">
+                <a16:creationId xmlns:a16="http://schemas.microsoft.com/office/drawing/2014/main" id="{093B0BC3-7BFF-4BDE-6861-03555672804D}"/>
+              </a:ext>
+            </a:extLst>
+          </p:cNvPr>
+          <p:cNvSpPr txBox="1"/>
+          <p:nvPr/>
+        </p:nvSpPr>
+        <p:spPr>
+          <a:xfrm>
+            <a:off x="8131812" y="5156954"/>
+            <a:ext cx="2909568" cy="369332"/>
+          </a:xfrm>
+          <a:prstGeom prst="rect">
+            <a:avLst/>
+          </a:prstGeom>
+          <a:solidFill>
+            <a:schemeClr val="accent1">
+              <a:lumMod val="20000"/>
+              <a:lumOff val="80000"/>
+            </a:schemeClr>
+          </a:solidFill>
+          <a:ln>
+            <a:solidFill>
+              <a:schemeClr val="accent1">
+                <a:lumMod val="20000"/>
+                <a:lumOff val="80000"/>
+              </a:schemeClr>
+            </a:solidFill>
+          </a:ln>
+        </p:spPr>
+        <p:txBody>
+          <a:bodyPr wrap="square">
+            <a:spAutoFit/>
+          </a:bodyPr>
+          <a:lstStyle/>
+          <a:p>
+            <a:r>
+              <a:rPr lang="en-US" dirty="0"/>
+              <a:t>MAY – severe wasting 2.6% </a:t>
+            </a:r>
+          </a:p>
+        </p:txBody>
+      </p:sp>
+      <p:sp>
+        <p:nvSpPr>
+          <p:cNvPr id="9" name="TextBox 8">
+            <a:extLst>
+              <a:ext uri="{FF2B5EF4-FFF2-40B4-BE49-F238E27FC236}">
+                <a16:creationId xmlns:a16="http://schemas.microsoft.com/office/drawing/2014/main" id="{87D1848C-FDED-B166-FA6F-66E08612AB11}"/>
+              </a:ext>
+            </a:extLst>
+          </p:cNvPr>
+          <p:cNvSpPr txBox="1"/>
+          <p:nvPr/>
+        </p:nvSpPr>
+        <p:spPr>
+          <a:xfrm>
+            <a:off x="9255762" y="2169914"/>
+            <a:ext cx="2829558" cy="369332"/>
+          </a:xfrm>
+          <a:prstGeom prst="rect">
+            <a:avLst/>
+          </a:prstGeom>
+          <a:solidFill>
+            <a:schemeClr val="accent1">
+              <a:lumMod val="20000"/>
+              <a:lumOff val="80000"/>
+            </a:schemeClr>
+          </a:solidFill>
+          <a:ln>
+            <a:solidFill>
+              <a:schemeClr val="accent1">
+                <a:lumMod val="20000"/>
+                <a:lumOff val="80000"/>
+              </a:schemeClr>
+            </a:solidFill>
+          </a:ln>
+        </p:spPr>
+        <p:txBody>
+          <a:bodyPr wrap="square">
+            <a:spAutoFit/>
+          </a:bodyPr>
+          <a:lstStyle/>
+          <a:p>
+            <a:r>
+              <a:rPr lang="en-US" dirty="0"/>
+              <a:t>FEB – severe wasting -1.0% </a:t>
+            </a:r>
+          </a:p>
+        </p:txBody>
+      </p:sp>
+    </p:spTree>
+    <p:extLst>
+      <p:ext uri="{BB962C8B-B14F-4D97-AF65-F5344CB8AC3E}">
+        <p14:creationId xmlns:p14="http://schemas.microsoft.com/office/powerpoint/2010/main" val="1649791741"/>
+      </p:ext>
+    </p:extLst>
+  </p:cSld>
+  <p:clrMapOvr>
+    <a:masterClrMapping/>
+  </p:clrMapOvr>
+</p:sld>
+</file>
+
+<file path=ppt/slides/slide11.xml><?xml version="1.0" encoding="utf-8"?>
+<p:sld xmlns:a="http://schemas.openxmlformats.org/drawingml/2006/main" xmlns:r="http://schemas.openxmlformats.org/officeDocument/2006/relationships" xmlns:p="http://schemas.openxmlformats.org/presentationml/2006/main">
+  <p:cSld>
+    <p:spTree>
+      <p:nvGrpSpPr>
+        <p:cNvPr id="1" name=""/>
+        <p:cNvGrpSpPr/>
+        <p:nvPr/>
+      </p:nvGrpSpPr>
+      <p:grpSpPr>
+        <a:xfrm>
+          <a:off x="0" y="0"/>
+          <a:ext cx="0" cy="0"/>
+          <a:chOff x="0" y="0"/>
+          <a:chExt cx="0" cy="0"/>
+        </a:xfrm>
+      </p:grpSpPr>
       <p:pic>
         <p:nvPicPr>
           <p:cNvPr id="4" name="Picture 3" descr="A labeled diagram of waves.">
@@ -5693,7 +6102,7 @@
 </p:sld>
 </file>
 
-<file path=ppt/slides/slide11.xml><?xml version="1.0" encoding="utf-8"?>
+<file path=ppt/slides/slide12.xml><?xml version="1.0" encoding="utf-8"?>
 <p:sld xmlns:a="http://schemas.openxmlformats.org/drawingml/2006/main" xmlns:r="http://schemas.openxmlformats.org/officeDocument/2006/relationships" xmlns:p="http://schemas.openxmlformats.org/presentationml/2006/main">
   <p:cSld>
     <p:spTree>
@@ -11840,7 +12249,7 @@
 </p:sld>
 </file>
 
-<file path=ppt/slides/slide12.xml><?xml version="1.0" encoding="utf-8"?>
+<file path=ppt/slides/slide13.xml><?xml version="1.0" encoding="utf-8"?>
 <p:sld xmlns:a="http://schemas.openxmlformats.org/drawingml/2006/main" xmlns:r="http://schemas.openxmlformats.org/officeDocument/2006/relationships" xmlns:p="http://schemas.openxmlformats.org/presentationml/2006/main">
   <p:cSld>
     <p:spTree>
@@ -12013,7 +12422,7 @@
 </p:sld>
 </file>
 
-<file path=ppt/slides/slide13.xml><?xml version="1.0" encoding="utf-8"?>
+<file path=ppt/slides/slide14.xml><?xml version="1.0" encoding="utf-8"?>
 <p:sld xmlns:a="http://schemas.openxmlformats.org/drawingml/2006/main" xmlns:r="http://schemas.openxmlformats.org/officeDocument/2006/relationships" xmlns:p="http://schemas.openxmlformats.org/presentationml/2006/main">
   <p:cSld>
     <p:bg>
@@ -12657,7 +13066,7 @@
 </p:sld>
 </file>
 
-<file path=ppt/slides/slide14.xml><?xml version="1.0" encoding="utf-8"?>
+<file path=ppt/slides/slide15.xml><?xml version="1.0" encoding="utf-8"?>
 <p:sld xmlns:a="http://schemas.openxmlformats.org/drawingml/2006/main" xmlns:r="http://schemas.openxmlformats.org/officeDocument/2006/relationships" xmlns:p="http://schemas.openxmlformats.org/presentationml/2006/main">
   <p:cSld>
     <p:spTree>
@@ -15311,7 +15720,7 @@
           <p:cNvPr id="2" name="Title 1">
             <a:extLst>
               <a:ext uri="{FF2B5EF4-FFF2-40B4-BE49-F238E27FC236}">
-                <a16:creationId xmlns:a16="http://schemas.microsoft.com/office/drawing/2014/main" id="{B0E28064-642E-E64D-9147-19DB74ED03C6}"/>
+                <a16:creationId xmlns:a16="http://schemas.microsoft.com/office/drawing/2014/main" id="{23D8096F-8EFA-DFAC-0F77-52DF3175A417}"/>
               </a:ext>
             </a:extLst>
           </p:cNvPr>
@@ -15322,14 +15731,19 @@
             <p:ph type="title"/>
           </p:nvPr>
         </p:nvSpPr>
-        <p:spPr/>
+        <p:spPr>
+          <a:xfrm>
+            <a:off x="205153" y="141321"/>
+            <a:ext cx="10515600" cy="837023"/>
+          </a:xfrm>
+        </p:spPr>
         <p:txBody>
           <a:bodyPr/>
           <a:lstStyle/>
           <a:p>
             <a:r>
               <a:rPr lang="en-US" dirty="0"/>
-              <a:t>The importance to use a seasonally adjusted estimate of wasting for annual planning</a:t>
+              <a:t>The effect of heat on mortality and nutrition</a:t>
             </a:r>
           </a:p>
         </p:txBody>
@@ -15339,7 +15753,7 @@
           <p:cNvPr id="3" name="Content Placeholder 2">
             <a:extLst>
               <a:ext uri="{FF2B5EF4-FFF2-40B4-BE49-F238E27FC236}">
-                <a16:creationId xmlns:a16="http://schemas.microsoft.com/office/drawing/2014/main" id="{06E75016-E005-DDA6-4FB1-C68F52C9728D}"/>
+                <a16:creationId xmlns:a16="http://schemas.microsoft.com/office/drawing/2014/main" id="{5562A36E-C111-9C76-FCD8-6F4533583AA4}"/>
               </a:ext>
             </a:extLst>
           </p:cNvPr>
@@ -15352,42 +15766,447 @@
         </p:nvSpPr>
         <p:spPr>
           <a:xfrm>
-            <a:off x="292130" y="1825625"/>
-            <a:ext cx="4838670" cy="4351338"/>
+            <a:off x="205153" y="1855656"/>
+            <a:ext cx="3181292" cy="4351338"/>
           </a:xfrm>
         </p:spPr>
         <p:txBody>
-          <a:bodyPr/>
+          <a:bodyPr>
+            <a:normAutofit/>
+          </a:bodyPr>
           <a:lstStyle/>
           <a:p>
             <a:r>
+              <a:rPr lang="en-US" sz="2400" b="0" i="0" dirty="0">
+                <a:solidFill>
+                  <a:srgbClr val="222222"/>
+                </a:solidFill>
+                <a:effectLst/>
+                <a:latin typeface="Harding"/>
+              </a:rPr>
+              <a:t>A study of DHS data from 29 low- and middle-income countries from 2001 to 2019, found across all countries, 1.5% of neonatal deaths were heat-related.</a:t>
+            </a:r>
+            <a:endParaRPr lang="en-US" sz="2400" dirty="0"/>
+          </a:p>
+        </p:txBody>
+      </p:sp>
+      <p:sp>
+        <p:nvSpPr>
+          <p:cNvPr id="5" name="TextBox 4">
+            <a:extLst>
+              <a:ext uri="{FF2B5EF4-FFF2-40B4-BE49-F238E27FC236}">
+                <a16:creationId xmlns:a16="http://schemas.microsoft.com/office/drawing/2014/main" id="{030CAE6C-D7DF-8B45-E011-D2AFDD406002}"/>
+              </a:ext>
+            </a:extLst>
+          </p:cNvPr>
+          <p:cNvSpPr txBox="1"/>
+          <p:nvPr/>
+        </p:nvSpPr>
+        <p:spPr>
+          <a:xfrm>
+            <a:off x="6273800" y="6446836"/>
+            <a:ext cx="6096000" cy="276999"/>
+          </a:xfrm>
+          <a:prstGeom prst="rect">
+            <a:avLst/>
+          </a:prstGeom>
+          <a:noFill/>
+        </p:spPr>
+        <p:txBody>
+          <a:bodyPr wrap="square">
+            <a:spAutoFit/>
+          </a:bodyPr>
+          <a:lstStyle>
+            <a:defPPr>
+              <a:defRPr lang="en-US"/>
+            </a:defPPr>
+            <a:lvl1pPr>
+              <a:defRPr sz="1200"/>
+            </a:lvl1pPr>
+          </a:lstStyle>
+          <a:p>
+            <a:r>
               <a:rPr lang="en-US" dirty="0"/>
-              <a:t>Seasonal peaks and troughs do not always correspond to assumptions (especially when wasting presents twin peaks)</a:t>
-            </a:r>
-          </a:p>
-          <a:p>
-            <a:r>
-              <a:rPr lang="en-US" dirty="0"/>
-              <a:t>Use of source with data collection in February will underestimate the caseload.</a:t>
-            </a:r>
-          </a:p>
-          <a:p>
-            <a:r>
-              <a:rPr lang="en-US" dirty="0"/>
-              <a:t>Use of a source with data collection in May will overestimate the caseload</a:t>
-            </a:r>
-          </a:p>
-          <a:p>
-            <a:endParaRPr lang="en-US" dirty="0"/>
+              <a:t>https://www.sciencedirect.com/science/article/pii/S0095069622000626</a:t>
+            </a:r>
+          </a:p>
+        </p:txBody>
+      </p:sp>
+      <p:sp>
+        <p:nvSpPr>
+          <p:cNvPr id="6" name="Content Placeholder 2">
+            <a:extLst>
+              <a:ext uri="{FF2B5EF4-FFF2-40B4-BE49-F238E27FC236}">
+                <a16:creationId xmlns:a16="http://schemas.microsoft.com/office/drawing/2014/main" id="{FBB8A711-ED18-D418-A3CD-3F6D0CF4F06B}"/>
+              </a:ext>
+            </a:extLst>
+          </p:cNvPr>
+          <p:cNvSpPr txBox="1">
+            <a:spLocks/>
+          </p:cNvSpPr>
+          <p:nvPr/>
+        </p:nvSpPr>
+        <p:spPr>
+          <a:xfrm>
+            <a:off x="6273800" y="4923438"/>
+            <a:ext cx="5187950" cy="4351338"/>
+          </a:xfrm>
+          <a:prstGeom prst="rect">
+            <a:avLst/>
+          </a:prstGeom>
+        </p:spPr>
+        <p:txBody>
+          <a:bodyPr vert="horz" lIns="91440" tIns="45720" rIns="91440" bIns="45720" rtlCol="0">
+            <a:normAutofit/>
+          </a:bodyPr>
+          <a:lstStyle>
+            <a:lvl1pPr marL="228600" indent="-228600" algn="l" defTabSz="914400" rtl="0" eaLnBrk="1" latinLnBrk="0" hangingPunct="1">
+              <a:lnSpc>
+                <a:spcPct val="90000"/>
+              </a:lnSpc>
+              <a:spcBef>
+                <a:spcPts val="1000"/>
+              </a:spcBef>
+              <a:buFont typeface="Arial" panose="020B0604020202020204" pitchFamily="34" charset="0"/>
+              <a:buChar char="•"/>
+              <a:defRPr sz="2800" kern="1200">
+                <a:solidFill>
+                  <a:schemeClr val="tx1"/>
+                </a:solidFill>
+                <a:latin typeface="+mn-lt"/>
+                <a:ea typeface="+mn-ea"/>
+                <a:cs typeface="+mn-cs"/>
+              </a:defRPr>
+            </a:lvl1pPr>
+            <a:lvl2pPr marL="685800" indent="-228600" algn="l" defTabSz="914400" rtl="0" eaLnBrk="1" latinLnBrk="0" hangingPunct="1">
+              <a:lnSpc>
+                <a:spcPct val="90000"/>
+              </a:lnSpc>
+              <a:spcBef>
+                <a:spcPts val="500"/>
+              </a:spcBef>
+              <a:buFont typeface="Arial" panose="020B0604020202020204" pitchFamily="34" charset="0"/>
+              <a:buChar char="•"/>
+              <a:defRPr sz="2400" kern="1200">
+                <a:solidFill>
+                  <a:schemeClr val="tx1"/>
+                </a:solidFill>
+                <a:latin typeface="+mn-lt"/>
+                <a:ea typeface="+mn-ea"/>
+                <a:cs typeface="+mn-cs"/>
+              </a:defRPr>
+            </a:lvl2pPr>
+            <a:lvl3pPr marL="1143000" indent="-228600" algn="l" defTabSz="914400" rtl="0" eaLnBrk="1" latinLnBrk="0" hangingPunct="1">
+              <a:lnSpc>
+                <a:spcPct val="90000"/>
+              </a:lnSpc>
+              <a:spcBef>
+                <a:spcPts val="500"/>
+              </a:spcBef>
+              <a:buFont typeface="Arial" panose="020B0604020202020204" pitchFamily="34" charset="0"/>
+              <a:buChar char="•"/>
+              <a:defRPr sz="2000" kern="1200">
+                <a:solidFill>
+                  <a:schemeClr val="tx1"/>
+                </a:solidFill>
+                <a:latin typeface="+mn-lt"/>
+                <a:ea typeface="+mn-ea"/>
+                <a:cs typeface="+mn-cs"/>
+              </a:defRPr>
+            </a:lvl3pPr>
+            <a:lvl4pPr marL="1600200" indent="-228600" algn="l" defTabSz="914400" rtl="0" eaLnBrk="1" latinLnBrk="0" hangingPunct="1">
+              <a:lnSpc>
+                <a:spcPct val="90000"/>
+              </a:lnSpc>
+              <a:spcBef>
+                <a:spcPts val="500"/>
+              </a:spcBef>
+              <a:buFont typeface="Arial" panose="020B0604020202020204" pitchFamily="34" charset="0"/>
+              <a:buChar char="•"/>
+              <a:defRPr sz="1800" kern="1200">
+                <a:solidFill>
+                  <a:schemeClr val="tx1"/>
+                </a:solidFill>
+                <a:latin typeface="+mn-lt"/>
+                <a:ea typeface="+mn-ea"/>
+                <a:cs typeface="+mn-cs"/>
+              </a:defRPr>
+            </a:lvl4pPr>
+            <a:lvl5pPr marL="2057400" indent="-228600" algn="l" defTabSz="914400" rtl="0" eaLnBrk="1" latinLnBrk="0" hangingPunct="1">
+              <a:lnSpc>
+                <a:spcPct val="90000"/>
+              </a:lnSpc>
+              <a:spcBef>
+                <a:spcPts val="500"/>
+              </a:spcBef>
+              <a:buFont typeface="Arial" panose="020B0604020202020204" pitchFamily="34" charset="0"/>
+              <a:buChar char="•"/>
+              <a:defRPr sz="1800" kern="1200">
+                <a:solidFill>
+                  <a:schemeClr val="tx1"/>
+                </a:solidFill>
+                <a:latin typeface="+mn-lt"/>
+                <a:ea typeface="+mn-ea"/>
+                <a:cs typeface="+mn-cs"/>
+              </a:defRPr>
+            </a:lvl5pPr>
+            <a:lvl6pPr marL="2514600" indent="-228600" algn="l" defTabSz="914400" rtl="0" eaLnBrk="1" latinLnBrk="0" hangingPunct="1">
+              <a:lnSpc>
+                <a:spcPct val="90000"/>
+              </a:lnSpc>
+              <a:spcBef>
+                <a:spcPts val="500"/>
+              </a:spcBef>
+              <a:buFont typeface="Arial" panose="020B0604020202020204" pitchFamily="34" charset="0"/>
+              <a:buChar char="•"/>
+              <a:defRPr sz="1800" kern="1200">
+                <a:solidFill>
+                  <a:schemeClr val="tx1"/>
+                </a:solidFill>
+                <a:latin typeface="+mn-lt"/>
+                <a:ea typeface="+mn-ea"/>
+                <a:cs typeface="+mn-cs"/>
+              </a:defRPr>
+            </a:lvl6pPr>
+            <a:lvl7pPr marL="2971800" indent="-228600" algn="l" defTabSz="914400" rtl="0" eaLnBrk="1" latinLnBrk="0" hangingPunct="1">
+              <a:lnSpc>
+                <a:spcPct val="90000"/>
+              </a:lnSpc>
+              <a:spcBef>
+                <a:spcPts val="500"/>
+              </a:spcBef>
+              <a:buFont typeface="Arial" panose="020B0604020202020204" pitchFamily="34" charset="0"/>
+              <a:buChar char="•"/>
+              <a:defRPr sz="1800" kern="1200">
+                <a:solidFill>
+                  <a:schemeClr val="tx1"/>
+                </a:solidFill>
+                <a:latin typeface="+mn-lt"/>
+                <a:ea typeface="+mn-ea"/>
+                <a:cs typeface="+mn-cs"/>
+              </a:defRPr>
+            </a:lvl7pPr>
+            <a:lvl8pPr marL="3429000" indent="-228600" algn="l" defTabSz="914400" rtl="0" eaLnBrk="1" latinLnBrk="0" hangingPunct="1">
+              <a:lnSpc>
+                <a:spcPct val="90000"/>
+              </a:lnSpc>
+              <a:spcBef>
+                <a:spcPts val="500"/>
+              </a:spcBef>
+              <a:buFont typeface="Arial" panose="020B0604020202020204" pitchFamily="34" charset="0"/>
+              <a:buChar char="•"/>
+              <a:defRPr sz="1800" kern="1200">
+                <a:solidFill>
+                  <a:schemeClr val="tx1"/>
+                </a:solidFill>
+                <a:latin typeface="+mn-lt"/>
+                <a:ea typeface="+mn-ea"/>
+                <a:cs typeface="+mn-cs"/>
+              </a:defRPr>
+            </a:lvl8pPr>
+            <a:lvl9pPr marL="3886200" indent="-228600" algn="l" defTabSz="914400" rtl="0" eaLnBrk="1" latinLnBrk="0" hangingPunct="1">
+              <a:lnSpc>
+                <a:spcPct val="90000"/>
+              </a:lnSpc>
+              <a:spcBef>
+                <a:spcPts val="500"/>
+              </a:spcBef>
+              <a:buFont typeface="Arial" panose="020B0604020202020204" pitchFamily="34" charset="0"/>
+              <a:buChar char="•"/>
+              <a:defRPr sz="1800" kern="1200">
+                <a:solidFill>
+                  <a:schemeClr val="tx1"/>
+                </a:solidFill>
+                <a:latin typeface="+mn-lt"/>
+                <a:ea typeface="+mn-ea"/>
+                <a:cs typeface="+mn-cs"/>
+              </a:defRPr>
+            </a:lvl9pPr>
+          </a:lstStyle>
+          <a:p>
+            <a:r>
+              <a:rPr lang="en-US" sz="1600" b="0" i="0" dirty="0">
+                <a:solidFill>
+                  <a:srgbClr val="1F1F1F"/>
+                </a:solidFill>
+                <a:effectLst/>
+                <a:latin typeface="ElsevierGulliver"/>
+              </a:rPr>
+              <a:t>From 9–15 months, a 100 h of mean monthly exposure to 30–35 °C heat increases the risk of wasting by about 4 percentage points.</a:t>
+            </a:r>
+          </a:p>
+          <a:p>
+            <a:r>
+              <a:rPr lang="en-US" sz="1600" b="0" i="0" dirty="0">
+                <a:solidFill>
+                  <a:srgbClr val="1F1F1F"/>
+                </a:solidFill>
+                <a:effectLst/>
+                <a:latin typeface="ElsevierGulliver"/>
+              </a:rPr>
+              <a:t>Similarly, 100 h of exposure above 35 °C increases the prevalence of stunting by 6 percentage points</a:t>
+            </a:r>
+            <a:endParaRPr lang="en-US" sz="2400" dirty="0">
+              <a:solidFill>
+                <a:srgbClr val="222222"/>
+              </a:solidFill>
+              <a:latin typeface="Harding"/>
+            </a:endParaRPr>
+          </a:p>
+        </p:txBody>
+      </p:sp>
+      <p:sp>
+        <p:nvSpPr>
+          <p:cNvPr id="7" name="TextBox 6">
+            <a:extLst>
+              <a:ext uri="{FF2B5EF4-FFF2-40B4-BE49-F238E27FC236}">
+                <a16:creationId xmlns:a16="http://schemas.microsoft.com/office/drawing/2014/main" id="{979ED388-C514-1941-1F5F-58BB67AF7AF8}"/>
+              </a:ext>
+            </a:extLst>
+          </p:cNvPr>
+          <p:cNvSpPr txBox="1"/>
+          <p:nvPr/>
+        </p:nvSpPr>
+        <p:spPr>
+          <a:xfrm>
+            <a:off x="90410" y="6476867"/>
+            <a:ext cx="6183390" cy="276999"/>
+          </a:xfrm>
+          <a:prstGeom prst="rect">
+            <a:avLst/>
+          </a:prstGeom>
+          <a:noFill/>
+        </p:spPr>
+        <p:txBody>
+          <a:bodyPr wrap="square">
+            <a:spAutoFit/>
+          </a:bodyPr>
+          <a:lstStyle/>
+          <a:p>
+            <a:r>
+              <a:rPr lang="en-US" sz="1200" dirty="0"/>
+              <a:t>https://www.nature.com/articles/s41467-024-49890-x?s=03#Sec12</a:t>
+            </a:r>
           </a:p>
         </p:txBody>
       </p:sp>
       <p:pic>
         <p:nvPicPr>
-          <p:cNvPr id="4" name="Picture 1" descr="A graph of a temperature&#10;&#10;AI-generated content may be incorrect.">
+          <p:cNvPr id="9" name="Picture 8">
             <a:extLst>
               <a:ext uri="{FF2B5EF4-FFF2-40B4-BE49-F238E27FC236}">
-                <a16:creationId xmlns:a16="http://schemas.microsoft.com/office/drawing/2014/main" id="{CEAEEEC5-55AB-EB50-F17D-1F684AC49038}"/>
+                <a16:creationId xmlns:a16="http://schemas.microsoft.com/office/drawing/2014/main" id="{AEF89524-5937-0522-C966-D32DD21F54FF}"/>
+              </a:ext>
+            </a:extLst>
+          </p:cNvPr>
+          <p:cNvPicPr>
+            <a:picLocks noChangeAspect="1"/>
+          </p:cNvPicPr>
+          <p:nvPr/>
+        </p:nvPicPr>
+        <p:blipFill>
+          <a:blip r:embed="rId3"/>
+          <a:stretch>
+            <a:fillRect/>
+          </a:stretch>
+        </p:blipFill>
+        <p:spPr>
+          <a:xfrm>
+            <a:off x="3359092" y="1936188"/>
+            <a:ext cx="2736908" cy="4460147"/>
+          </a:xfrm>
+          <a:prstGeom prst="rect">
+            <a:avLst/>
+          </a:prstGeom>
+        </p:spPr>
+      </p:pic>
+      <p:sp>
+        <p:nvSpPr>
+          <p:cNvPr id="11" name="TextBox 10">
+            <a:extLst>
+              <a:ext uri="{FF2B5EF4-FFF2-40B4-BE49-F238E27FC236}">
+                <a16:creationId xmlns:a16="http://schemas.microsoft.com/office/drawing/2014/main" id="{9B836C25-4A16-C5AE-7B38-ABAE9357677B}"/>
+              </a:ext>
+            </a:extLst>
+          </p:cNvPr>
+          <p:cNvSpPr txBox="1"/>
+          <p:nvPr/>
+        </p:nvSpPr>
+        <p:spPr>
+          <a:xfrm>
+            <a:off x="529137" y="1104801"/>
+            <a:ext cx="6205770" cy="523220"/>
+          </a:xfrm>
+          <a:prstGeom prst="rect">
+            <a:avLst/>
+          </a:prstGeom>
+          <a:noFill/>
+        </p:spPr>
+        <p:txBody>
+          <a:bodyPr wrap="square">
+            <a:spAutoFit/>
+          </a:bodyPr>
+          <a:lstStyle/>
+          <a:p>
+            <a:pPr marL="0" indent="0">
+              <a:buNone/>
+            </a:pPr>
+            <a:r>
+              <a:rPr lang="en-US" sz="2800" dirty="0"/>
+              <a:t>Child mortality and heat exposure</a:t>
+            </a:r>
+          </a:p>
+        </p:txBody>
+      </p:sp>
+      <p:sp>
+        <p:nvSpPr>
+          <p:cNvPr id="13" name="TextBox 12">
+            <a:extLst>
+              <a:ext uri="{FF2B5EF4-FFF2-40B4-BE49-F238E27FC236}">
+                <a16:creationId xmlns:a16="http://schemas.microsoft.com/office/drawing/2014/main" id="{40C1CF52-2C54-BD6D-928B-DC72801BEE6B}"/>
+              </a:ext>
+            </a:extLst>
+          </p:cNvPr>
+          <p:cNvSpPr txBox="1"/>
+          <p:nvPr/>
+        </p:nvSpPr>
+        <p:spPr>
+          <a:xfrm>
+            <a:off x="6096000" y="1104801"/>
+            <a:ext cx="6205770" cy="523220"/>
+          </a:xfrm>
+          <a:prstGeom prst="rect">
+            <a:avLst/>
+          </a:prstGeom>
+          <a:noFill/>
+        </p:spPr>
+        <p:txBody>
+          <a:bodyPr wrap="square">
+            <a:spAutoFit/>
+          </a:bodyPr>
+          <a:lstStyle>
+            <a:defPPr>
+              <a:defRPr lang="en-US"/>
+            </a:defPPr>
+            <a:lvl1pPr indent="0">
+              <a:buNone/>
+              <a:defRPr sz="2800"/>
+            </a:lvl1pPr>
+          </a:lstStyle>
+          <a:p>
+            <a:r>
+              <a:rPr lang="en-US" dirty="0"/>
+              <a:t>Child malnutrition and heat exposure</a:t>
+            </a:r>
+          </a:p>
+        </p:txBody>
+      </p:sp>
+      <p:pic>
+        <p:nvPicPr>
+          <p:cNvPr id="1026" name="Picture 2">
+            <a:extLst>
+              <a:ext uri="{FF2B5EF4-FFF2-40B4-BE49-F238E27FC236}">
+                <a16:creationId xmlns:a16="http://schemas.microsoft.com/office/drawing/2014/main" id="{31A44B37-2555-3DFA-EEA4-71A6F8EB4652}"/>
               </a:ext>
             </a:extLst>
           </p:cNvPr>
@@ -15397,7 +16216,7 @@
           <p:nvPr/>
         </p:nvPicPr>
         <p:blipFill>
-          <a:blip r:embed="rId2">
+          <a:blip r:embed="rId4">
             <a:extLst>
               <a:ext uri="{28A0092B-C50C-407E-A947-70E740481C1C}">
                 <a14:useLocalDpi xmlns:a14="http://schemas.microsoft.com/office/drawing/2010/main" val="0"/>
@@ -15411,16 +16230,13 @@
         </p:blipFill>
         <p:spPr bwMode="auto">
           <a:xfrm>
-            <a:off x="5717933" y="1825625"/>
-            <a:ext cx="6181937" cy="4537075"/>
+            <a:off x="6734907" y="1698317"/>
+            <a:ext cx="3931272" cy="2788582"/>
           </a:xfrm>
           <a:prstGeom prst="rect">
             <a:avLst/>
           </a:prstGeom>
           <a:noFill/>
-          <a:ln>
-            <a:noFill/>
-          </a:ln>
           <a:extLst>
             <a:ext uri="{909E8E84-426E-40DD-AFC4-6F175D3DCCD1}">
               <a14:hiddenFill xmlns:a14="http://schemas.microsoft.com/office/drawing/2010/main">
@@ -15429,25 +16245,15 @@
                 </a:solidFill>
               </a14:hiddenFill>
             </a:ext>
-            <a:ext uri="{91240B29-F687-4F45-9708-019B960494DF}">
-              <a14:hiddenLine xmlns:a14="http://schemas.microsoft.com/office/drawing/2010/main" w="9525">
-                <a:solidFill>
-                  <a:srgbClr val="000000"/>
-                </a:solidFill>
-                <a:miter lim="800000"/>
-                <a:headEnd/>
-                <a:tailEnd/>
-              </a14:hiddenLine>
-            </a:ext>
           </a:extLst>
         </p:spPr>
       </p:pic>
       <p:sp>
         <p:nvSpPr>
-          <p:cNvPr id="6" name="TextBox 5">
+          <p:cNvPr id="15" name="TextBox 14">
             <a:extLst>
               <a:ext uri="{FF2B5EF4-FFF2-40B4-BE49-F238E27FC236}">
-                <a16:creationId xmlns:a16="http://schemas.microsoft.com/office/drawing/2014/main" id="{093B0BC3-7BFF-4BDE-6861-03555672804D}"/>
+                <a16:creationId xmlns:a16="http://schemas.microsoft.com/office/drawing/2014/main" id="{EDE0FA3B-9817-5405-A09E-DCBF193E2DF0}"/>
               </a:ext>
             </a:extLst>
           </p:cNvPr>
@@ -15456,26 +16262,13 @@
         </p:nvSpPr>
         <p:spPr>
           <a:xfrm>
-            <a:off x="8131812" y="5156954"/>
-            <a:ext cx="2909568" cy="369332"/>
+            <a:off x="6540384" y="4589752"/>
+            <a:ext cx="6463147" cy="230832"/>
           </a:xfrm>
           <a:prstGeom prst="rect">
             <a:avLst/>
           </a:prstGeom>
-          <a:solidFill>
-            <a:schemeClr val="accent1">
-              <a:lumMod val="20000"/>
-              <a:lumOff val="80000"/>
-            </a:schemeClr>
-          </a:solidFill>
-          <a:ln>
-            <a:solidFill>
-              <a:schemeClr val="accent1">
-                <a:lumMod val="20000"/>
-                <a:lumOff val="80000"/>
-              </a:schemeClr>
-            </a:solidFill>
-          </a:ln>
+          <a:noFill/>
         </p:spPr>
         <p:txBody>
           <a:bodyPr wrap="square">
@@ -15484,64 +16277,23 @@
           <a:lstStyle/>
           <a:p>
             <a:r>
-              <a:rPr lang="en-US" dirty="0"/>
-              <a:t>MAY – severe wasting 2.6% </a:t>
-            </a:r>
-          </a:p>
-        </p:txBody>
-      </p:sp>
-      <p:sp>
-        <p:nvSpPr>
-          <p:cNvPr id="9" name="TextBox 8">
-            <a:extLst>
-              <a:ext uri="{FF2B5EF4-FFF2-40B4-BE49-F238E27FC236}">
-                <a16:creationId xmlns:a16="http://schemas.microsoft.com/office/drawing/2014/main" id="{87D1848C-FDED-B166-FA6F-66E08612AB11}"/>
-              </a:ext>
-            </a:extLst>
-          </p:cNvPr>
-          <p:cNvSpPr txBox="1"/>
-          <p:nvPr/>
-        </p:nvSpPr>
-        <p:spPr>
-          <a:xfrm>
-            <a:off x="9255762" y="2169914"/>
-            <a:ext cx="2829558" cy="369332"/>
-          </a:xfrm>
-          <a:prstGeom prst="rect">
-            <a:avLst/>
-          </a:prstGeom>
-          <a:solidFill>
-            <a:schemeClr val="accent1">
-              <a:lumMod val="20000"/>
-              <a:lumOff val="80000"/>
-            </a:schemeClr>
-          </a:solidFill>
-          <a:ln>
-            <a:solidFill>
-              <a:schemeClr val="accent1">
-                <a:lumMod val="20000"/>
-                <a:lumOff val="80000"/>
-              </a:schemeClr>
-            </a:solidFill>
-          </a:ln>
-        </p:spPr>
-        <p:txBody>
-          <a:bodyPr wrap="square">
-            <a:spAutoFit/>
-          </a:bodyPr>
-          <a:lstStyle/>
-          <a:p>
-            <a:r>
-              <a:rPr lang="en-US" dirty="0"/>
-              <a:t>FEB – severe wasting -1.0% </a:t>
-            </a:r>
+              <a:rPr lang="en-US" sz="900" b="0" i="0" dirty="0">
+                <a:solidFill>
+                  <a:srgbClr val="1F1F1F"/>
+                </a:solidFill>
+                <a:effectLst/>
+                <a:latin typeface="ElsevierGulliver"/>
+              </a:rPr>
+              <a:t>Age-specific effects of 100 h of mean monthly exposure to 30–35 °C in the last 90 days on WHZ and wasting</a:t>
+            </a:r>
+            <a:endParaRPr lang="en-US" sz="900" dirty="0"/>
           </a:p>
         </p:txBody>
       </p:sp>
     </p:spTree>
     <p:extLst>
       <p:ext uri="{BB962C8B-B14F-4D97-AF65-F5344CB8AC3E}">
-        <p14:creationId xmlns:p14="http://schemas.microsoft.com/office/powerpoint/2010/main" val="1649791741"/>
+        <p14:creationId xmlns:p14="http://schemas.microsoft.com/office/powerpoint/2010/main" val="2363725555"/>
       </p:ext>
     </p:extLst>
   </p:cSld>
@@ -16142,30 +16894,6 @@
 </file>
 
 <file path=customXml/item1.xml><?xml version="1.0" encoding="utf-8"?>
-<?mso-contentType ?>
-<FormTemplates xmlns="http://schemas.microsoft.com/sharepoint/v3/contenttype/forms">
-  <Display>DocumentLibraryForm</Display>
-  <Edit>DocumentLibraryForm</Edit>
-  <New>DocumentLibraryForm</New>
-</FormTemplates>
-</file>
-
-<file path=customXml/item2.xml><?xml version="1.0" encoding="utf-8"?>
-<p:properties xmlns:p="http://schemas.microsoft.com/office/2006/metadata/properties" xmlns:xsi="http://www.w3.org/2001/XMLSchema-instance" xmlns:pc="http://schemas.microsoft.com/office/infopath/2007/PartnerControls">
-  <documentManagement>
-    <TaxCatchAll xmlns="ca283e0b-db31-4043-a2ef-b80661bf084a" xsi:nil="true"/>
-    <lcf76f155ced4ddcb4097134ff3c332f xmlns="0304a777-9e20-4efa-89ba-852150dac193">
-      <Terms xmlns="http://schemas.microsoft.com/office/infopath/2007/PartnerControls"/>
-    </lcf76f155ced4ddcb4097134ff3c332f>
-    <Link xmlns="0304a777-9e20-4efa-89ba-852150dac193">
-      <Url xsi:nil="true"/>
-      <Description xsi:nil="true"/>
-    </Link>
-  </documentManagement>
-</p:properties>
-</file>
-
-<file path=customXml/item3.xml><?xml version="1.0" encoding="utf-8"?>
 <ct:contentTypeSchema xmlns:ct="http://schemas.microsoft.com/office/2006/metadata/contentType" xmlns:ma="http://schemas.microsoft.com/office/2006/metadata/properties/metaAttributes" ct:_="" ma:_="" ma:contentTypeName="Document" ma:contentTypeID="0x010100128EECD3A5547847935DE716913AE577" ma:contentTypeVersion="20" ma:contentTypeDescription="Create a new document." ma:contentTypeScope="" ma:versionID="01a005c2e7e5f5429d941c84c66fa426">
   <xsd:schema xmlns:xsd="http://www.w3.org/2001/XMLSchema" xmlns:xs="http://www.w3.org/2001/XMLSchema" xmlns:p="http://schemas.microsoft.com/office/2006/metadata/properties" xmlns:ns2="0304a777-9e20-4efa-89ba-852150dac193" xmlns:ns3="a8a9630b-75d6-4764-bb6e-6771892ef157" xmlns:ns4="ca283e0b-db31-4043-a2ef-b80661bf084a" targetNamespace="http://schemas.microsoft.com/office/2006/metadata/properties" ma:root="true" ma:fieldsID="f7406be0999ce290ee0cfe31a665c90b" ns2:_="" ns3:_="" ns4:_="">
     <xsd:import namespace="0304a777-9e20-4efa-89ba-852150dac193"/>
@@ -16444,26 +17172,31 @@
 </ct:contentTypeSchema>
 </file>
 
-<file path=customXml/itemProps1.xml><?xml version="1.0" encoding="utf-8"?>
-<ds:datastoreItem xmlns:ds="http://schemas.openxmlformats.org/officeDocument/2006/customXml" ds:itemID="{6DCD37BE-DB9E-475A-B72C-0157289838A1}">
-  <ds:schemaRefs>
-    <ds:schemaRef ds:uri="http://schemas.microsoft.com/sharepoint/v3/contenttype/forms"/>
-  </ds:schemaRefs>
-</ds:datastoreItem>
+<file path=customXml/item2.xml><?xml version="1.0" encoding="utf-8"?>
+<p:properties xmlns:p="http://schemas.microsoft.com/office/2006/metadata/properties" xmlns:xsi="http://www.w3.org/2001/XMLSchema-instance" xmlns:pc="http://schemas.microsoft.com/office/infopath/2007/PartnerControls">
+  <documentManagement>
+    <TaxCatchAll xmlns="ca283e0b-db31-4043-a2ef-b80661bf084a" xsi:nil="true"/>
+    <lcf76f155ced4ddcb4097134ff3c332f xmlns="0304a777-9e20-4efa-89ba-852150dac193">
+      <Terms xmlns="http://schemas.microsoft.com/office/infopath/2007/PartnerControls"/>
+    </lcf76f155ced4ddcb4097134ff3c332f>
+    <Link xmlns="0304a777-9e20-4efa-89ba-852150dac193">
+      <Url xsi:nil="true"/>
+      <Description xsi:nil="true"/>
+    </Link>
+  </documentManagement>
+</p:properties>
 </file>
 
-<file path=customXml/itemProps2.xml><?xml version="1.0" encoding="utf-8"?>
-<ds:datastoreItem xmlns:ds="http://schemas.openxmlformats.org/officeDocument/2006/customXml" ds:itemID="{7AD1A134-52A3-461E-BEDC-D144F058D468}">
-  <ds:schemaRefs>
-    <ds:schemaRef ds:uri="http://schemas.microsoft.com/office/2006/metadata/properties"/>
-    <ds:schemaRef ds:uri="http://schemas.microsoft.com/office/infopath/2007/PartnerControls"/>
-    <ds:schemaRef ds:uri="ca283e0b-db31-4043-a2ef-b80661bf084a"/>
-    <ds:schemaRef ds:uri="0304a777-9e20-4efa-89ba-852150dac193"/>
-  </ds:schemaRefs>
-</ds:datastoreItem>
+<file path=customXml/item3.xml><?xml version="1.0" encoding="utf-8"?>
+<?mso-contentType ?>
+<FormTemplates xmlns="http://schemas.microsoft.com/sharepoint/v3/contenttype/forms">
+  <Display>DocumentLibraryForm</Display>
+  <Edit>DocumentLibraryForm</Edit>
+  <New>DocumentLibraryForm</New>
+</FormTemplates>
 </file>
 
-<file path=customXml/itemProps3.xml><?xml version="1.0" encoding="utf-8"?>
+<file path=customXml/itemProps1.xml><?xml version="1.0" encoding="utf-8"?>
 <ds:datastoreItem xmlns:ds="http://schemas.openxmlformats.org/officeDocument/2006/customXml" ds:itemID="{A928FBBB-20E6-46ED-851F-587543385D94}">
   <ds:schemaRefs>
     <ds:schemaRef ds:uri="http://schemas.microsoft.com/office/2006/metadata/contentType"/>
@@ -16481,4 +17214,23 @@
     <ds:schemaRef ds:uri="http://schemas.microsoft.com/internal/obd"/>
   </ds:schemaRefs>
 </ds:datastoreItem>
+</file>
+
+<file path=customXml/itemProps2.xml><?xml version="1.0" encoding="utf-8"?>
+<ds:datastoreItem xmlns:ds="http://schemas.openxmlformats.org/officeDocument/2006/customXml" ds:itemID="{7AD1A134-52A3-461E-BEDC-D144F058D468}">
+  <ds:schemaRefs>
+    <ds:schemaRef ds:uri="http://schemas.microsoft.com/office/2006/metadata/properties"/>
+    <ds:schemaRef ds:uri="http://schemas.microsoft.com/office/infopath/2007/PartnerControls"/>
+    <ds:schemaRef ds:uri="ca283e0b-db31-4043-a2ef-b80661bf084a"/>
+    <ds:schemaRef ds:uri="0304a777-9e20-4efa-89ba-852150dac193"/>
+  </ds:schemaRefs>
+</ds:datastoreItem>
+</file>
+
+<file path=customXml/itemProps3.xml><?xml version="1.0" encoding="utf-8"?>
+<ds:datastoreItem xmlns:ds="http://schemas.openxmlformats.org/officeDocument/2006/customXml" ds:itemID="{6DCD37BE-DB9E-475A-B72C-0157289838A1}">
+  <ds:schemaRefs>
+    <ds:schemaRef ds:uri="http://schemas.microsoft.com/sharepoint/v3/contenttype/forms"/>
+  </ds:schemaRefs>
+</ds:datastoreItem>
 </file>
</xml_diff>

<commit_message>
updated language on peak maximum temperature
</commit_message>
<xml_diff>
--- a/Seasonally Adjusted Wasting Estimates_EN.pptx
+++ b/Seasonally Adjusted Wasting Estimates_EN.pptx
@@ -165,18 +165,18 @@
   <pc:docChgLst>
     <pc:chgData name="Robert Johnston" userId="e719122a-9d1f-4de8-aa66-43936ca21595" providerId="ADAL" clId="{C9A66CFB-6042-496C-912C-F085CF7B408C}"/>
     <pc:docChg chg="custSel addSld delSld modSld modSection">
-      <pc:chgData name="Robert Johnston" userId="e719122a-9d1f-4de8-aa66-43936ca21595" providerId="ADAL" clId="{C9A66CFB-6042-496C-912C-F085CF7B408C}" dt="2025-06-25T16:57:30.262" v="60" actId="27636"/>
+      <pc:chgData name="Robert Johnston" userId="e719122a-9d1f-4de8-aa66-43936ca21595" providerId="ADAL" clId="{C9A66CFB-6042-496C-912C-F085CF7B408C}" dt="2025-07-17T12:44:23.142" v="72" actId="20577"/>
       <pc:docMkLst>
         <pc:docMk/>
       </pc:docMkLst>
       <pc:sldChg chg="modSp mod">
-        <pc:chgData name="Robert Johnston" userId="e719122a-9d1f-4de8-aa66-43936ca21595" providerId="ADAL" clId="{C9A66CFB-6042-496C-912C-F085CF7B408C}" dt="2025-06-24T14:00:35.730" v="19" actId="6549"/>
+        <pc:chgData name="Robert Johnston" userId="e719122a-9d1f-4de8-aa66-43936ca21595" providerId="ADAL" clId="{C9A66CFB-6042-496C-912C-F085CF7B408C}" dt="2025-07-17T12:44:23.142" v="72" actId="20577"/>
         <pc:sldMkLst>
           <pc:docMk/>
           <pc:sldMk cId="2683659940" sldId="2147375699"/>
         </pc:sldMkLst>
         <pc:spChg chg="mod">
-          <ac:chgData name="Robert Johnston" userId="e719122a-9d1f-4de8-aa66-43936ca21595" providerId="ADAL" clId="{C9A66CFB-6042-496C-912C-F085CF7B408C}" dt="2025-06-24T14:00:35.730" v="19" actId="6549"/>
+          <ac:chgData name="Robert Johnston" userId="e719122a-9d1f-4de8-aa66-43936ca21595" providerId="ADAL" clId="{C9A66CFB-6042-496C-912C-F085CF7B408C}" dt="2025-07-17T12:44:23.142" v="72" actId="20577"/>
           <ac:spMkLst>
             <pc:docMk/>
             <pc:sldMk cId="2683659940" sldId="2147375699"/>
@@ -353,7 +353,7 @@
           <a:p>
             <a:fld id="{51918E58-3E89-408C-BCD2-F7156ACDE59C}" type="datetimeFigureOut">
               <a:rPr lang="en-US" smtClean="0"/>
-              <a:t>6/25/2025</a:t>
+              <a:t>7/17/2025</a:t>
             </a:fld>
             <a:endParaRPr lang="en-US"/>
           </a:p>
@@ -2359,7 +2359,7 @@
           <a:p>
             <a:fld id="{7A0920A2-F505-4459-A6C8-D3165AA23904}" type="datetimeFigureOut">
               <a:rPr lang="en-US" smtClean="0"/>
-              <a:t>6/25/2025</a:t>
+              <a:t>7/17/2025</a:t>
             </a:fld>
             <a:endParaRPr lang="en-US"/>
           </a:p>
@@ -2557,7 +2557,7 @@
           <a:p>
             <a:fld id="{7A0920A2-F505-4459-A6C8-D3165AA23904}" type="datetimeFigureOut">
               <a:rPr lang="en-US" smtClean="0"/>
-              <a:t>6/25/2025</a:t>
+              <a:t>7/17/2025</a:t>
             </a:fld>
             <a:endParaRPr lang="en-US"/>
           </a:p>
@@ -2765,7 +2765,7 @@
           <a:p>
             <a:fld id="{7A0920A2-F505-4459-A6C8-D3165AA23904}" type="datetimeFigureOut">
               <a:rPr lang="en-US" smtClean="0"/>
-              <a:t>6/25/2025</a:t>
+              <a:t>7/17/2025</a:t>
             </a:fld>
             <a:endParaRPr lang="en-US"/>
           </a:p>
@@ -2963,7 +2963,7 @@
           <a:p>
             <a:fld id="{7A0920A2-F505-4459-A6C8-D3165AA23904}" type="datetimeFigureOut">
               <a:rPr lang="en-US" smtClean="0"/>
-              <a:t>6/25/2025</a:t>
+              <a:t>7/17/2025</a:t>
             </a:fld>
             <a:endParaRPr lang="en-US"/>
           </a:p>
@@ -3238,7 +3238,7 @@
           <a:p>
             <a:fld id="{7A0920A2-F505-4459-A6C8-D3165AA23904}" type="datetimeFigureOut">
               <a:rPr lang="en-US" smtClean="0"/>
-              <a:t>6/25/2025</a:t>
+              <a:t>7/17/2025</a:t>
             </a:fld>
             <a:endParaRPr lang="en-US"/>
           </a:p>
@@ -3503,7 +3503,7 @@
           <a:p>
             <a:fld id="{7A0920A2-F505-4459-A6C8-D3165AA23904}" type="datetimeFigureOut">
               <a:rPr lang="en-US" smtClean="0"/>
-              <a:t>6/25/2025</a:t>
+              <a:t>7/17/2025</a:t>
             </a:fld>
             <a:endParaRPr lang="en-US"/>
           </a:p>
@@ -3915,7 +3915,7 @@
           <a:p>
             <a:fld id="{7A0920A2-F505-4459-A6C8-D3165AA23904}" type="datetimeFigureOut">
               <a:rPr lang="en-US" smtClean="0"/>
-              <a:t>6/25/2025</a:t>
+              <a:t>7/17/2025</a:t>
             </a:fld>
             <a:endParaRPr lang="en-US"/>
           </a:p>
@@ -4056,7 +4056,7 @@
           <a:p>
             <a:fld id="{7A0920A2-F505-4459-A6C8-D3165AA23904}" type="datetimeFigureOut">
               <a:rPr lang="en-US" smtClean="0"/>
-              <a:t>6/25/2025</a:t>
+              <a:t>7/17/2025</a:t>
             </a:fld>
             <a:endParaRPr lang="en-US"/>
           </a:p>
@@ -4169,7 +4169,7 @@
           <a:p>
             <a:fld id="{7A0920A2-F505-4459-A6C8-D3165AA23904}" type="datetimeFigureOut">
               <a:rPr lang="en-US" smtClean="0"/>
-              <a:t>6/25/2025</a:t>
+              <a:t>7/17/2025</a:t>
             </a:fld>
             <a:endParaRPr lang="en-US"/>
           </a:p>
@@ -4480,7 +4480,7 @@
           <a:p>
             <a:fld id="{7A0920A2-F505-4459-A6C8-D3165AA23904}" type="datetimeFigureOut">
               <a:rPr lang="en-US" smtClean="0"/>
-              <a:t>6/25/2025</a:t>
+              <a:t>7/17/2025</a:t>
             </a:fld>
             <a:endParaRPr lang="en-US"/>
           </a:p>
@@ -4768,7 +4768,7 @@
           <a:p>
             <a:fld id="{7A0920A2-F505-4459-A6C8-D3165AA23904}" type="datetimeFigureOut">
               <a:rPr lang="en-US" smtClean="0"/>
-              <a:t>6/25/2025</a:t>
+              <a:t>7/17/2025</a:t>
             </a:fld>
             <a:endParaRPr lang="en-US"/>
           </a:p>
@@ -5009,7 +5009,7 @@
           <a:p>
             <a:fld id="{7A0920A2-F505-4459-A6C8-D3165AA23904}" type="datetimeFigureOut">
               <a:rPr lang="en-US" smtClean="0"/>
-              <a:t>6/25/2025</a:t>
+              <a:t>7/17/2025</a:t>
             </a:fld>
             <a:endParaRPr lang="en-US"/>
           </a:p>
@@ -6203,7 +6203,15 @@
           <a:p>
             <a:r>
               <a:rPr lang="en-US" sz="2400" dirty="0"/>
-              <a:t>Enter the recorded average peak temperature for all months of the year. Use a population adjusted estimate of average peak temperature so that the temperature corresponds to populated areas. </a:t>
+              <a:t>Enter the recorded average maximum temperature for all months of the year. Use a population adjusted estimate of average peak temperature so that </a:t>
+            </a:r>
+            <a:r>
+              <a:rPr lang="en-US" sz="2400"/>
+              <a:t>the temperature data </a:t>
+            </a:r>
+            <a:r>
+              <a:rPr lang="en-US" sz="2400" dirty="0"/>
+              <a:t>corresponds to populated areas. </a:t>
             </a:r>
           </a:p>
           <a:p>
@@ -17173,6 +17181,15 @@
 </file>
 
 <file path=customXml/item2.xml><?xml version="1.0" encoding="utf-8"?>
+<?mso-contentType ?>
+<FormTemplates xmlns="http://schemas.microsoft.com/sharepoint/v3/contenttype/forms">
+  <Display>DocumentLibraryForm</Display>
+  <Edit>DocumentLibraryForm</Edit>
+  <New>DocumentLibraryForm</New>
+</FormTemplates>
+</file>
+
+<file path=customXml/item3.xml><?xml version="1.0" encoding="utf-8"?>
 <p:properties xmlns:p="http://schemas.microsoft.com/office/2006/metadata/properties" xmlns:xsi="http://www.w3.org/2001/XMLSchema-instance" xmlns:pc="http://schemas.microsoft.com/office/infopath/2007/PartnerControls">
   <documentManagement>
     <TaxCatchAll xmlns="ca283e0b-db31-4043-a2ef-b80661bf084a" xsi:nil="true"/>
@@ -17185,15 +17202,6 @@
     </Link>
   </documentManagement>
 </p:properties>
-</file>
-
-<file path=customXml/item3.xml><?xml version="1.0" encoding="utf-8"?>
-<?mso-contentType ?>
-<FormTemplates xmlns="http://schemas.microsoft.com/sharepoint/v3/contenttype/forms">
-  <Display>DocumentLibraryForm</Display>
-  <Edit>DocumentLibraryForm</Edit>
-  <New>DocumentLibraryForm</New>
-</FormTemplates>
 </file>
 
 <file path=customXml/itemProps1.xml><?xml version="1.0" encoding="utf-8"?>
@@ -17217,6 +17225,14 @@
 </file>
 
 <file path=customXml/itemProps2.xml><?xml version="1.0" encoding="utf-8"?>
+<ds:datastoreItem xmlns:ds="http://schemas.openxmlformats.org/officeDocument/2006/customXml" ds:itemID="{6DCD37BE-DB9E-475A-B72C-0157289838A1}">
+  <ds:schemaRefs>
+    <ds:schemaRef ds:uri="http://schemas.microsoft.com/sharepoint/v3/contenttype/forms"/>
+  </ds:schemaRefs>
+</ds:datastoreItem>
+</file>
+
+<file path=customXml/itemProps3.xml><?xml version="1.0" encoding="utf-8"?>
 <ds:datastoreItem xmlns:ds="http://schemas.openxmlformats.org/officeDocument/2006/customXml" ds:itemID="{7AD1A134-52A3-461E-BEDC-D144F058D468}">
   <ds:schemaRefs>
     <ds:schemaRef ds:uri="http://schemas.microsoft.com/office/2006/metadata/properties"/>
@@ -17225,12 +17241,4 @@
     <ds:schemaRef ds:uri="0304a777-9e20-4efa-89ba-852150dac193"/>
   </ds:schemaRefs>
 </ds:datastoreItem>
-</file>
-
-<file path=customXml/itemProps3.xml><?xml version="1.0" encoding="utf-8"?>
-<ds:datastoreItem xmlns:ds="http://schemas.openxmlformats.org/officeDocument/2006/customXml" ds:itemID="{6DCD37BE-DB9E-475A-B72C-0157289838A1}">
-  <ds:schemaRefs>
-    <ds:schemaRef ds:uri="http://schemas.microsoft.com/sharepoint/v3/contenttype/forms"/>
-  </ds:schemaRefs>
-</ds:datastoreItem>
 </file>
</xml_diff>